<commit_message>
Upload of a complete DNN working. Next step is generating VHDL code script
</commit_message>
<xml_diff>
--- a/doc/Development of an Intermittent Computing Architecture for Machine.pptx
+++ b/doc/Development of an Intermittent Computing Architecture for Machine.pptx
@@ -520,7 +520,7 @@
           <a:p>
             <a:fld id="{AFD01546-198A-4195-BCF8-F0FF54C90E5E}" type="datetimeFigureOut">
               <a:rPr lang="en-US" smtClean="0"/>
-              <a:t>5/29/2022</a:t>
+              <a:t>8/28/2022</a:t>
             </a:fld>
             <a:endParaRPr lang="en-US" dirty="0"/>
           </a:p>
@@ -1116,7 +1116,7 @@
           <a:p>
             <a:fld id="{88D38747-4367-4BD2-8D51-C97E202738E2}" type="datetime1">
               <a:rPr lang="en-US" smtClean="0"/>
-              <a:t>5/29/2022</a:t>
+              <a:t>8/28/2022</a:t>
             </a:fld>
             <a:endParaRPr lang="en-US" dirty="0"/>
           </a:p>
@@ -1421,7 +1421,7 @@
           <a:p>
             <a:fld id="{11F1B079-7EF0-44EE-B798-BCC497C9F3B2}" type="datetime1">
               <a:rPr lang="en-US" smtClean="0"/>
-              <a:t>5/29/2022</a:t>
+              <a:t>8/28/2022</a:t>
             </a:fld>
             <a:endParaRPr lang="en-US" dirty="0"/>
           </a:p>
@@ -1615,7 +1615,7 @@
           <a:p>
             <a:fld id="{28FF70A8-1D13-4657-95F0-A9EA54967B8D}" type="datetime1">
               <a:rPr lang="en-US" smtClean="0"/>
-              <a:t>5/29/2022</a:t>
+              <a:t>8/28/2022</a:t>
             </a:fld>
             <a:endParaRPr lang="en-US" dirty="0"/>
           </a:p>
@@ -1878,7 +1878,7 @@
           <a:p>
             <a:fld id="{21EB90AC-71BD-4C7F-8ACA-7B3F18292E63}" type="datetime1">
               <a:rPr lang="en-US" smtClean="0"/>
-              <a:t>5/29/2022</a:t>
+              <a:t>8/28/2022</a:t>
             </a:fld>
             <a:endParaRPr lang="en-US" dirty="0"/>
           </a:p>
@@ -2314,7 +2314,7 @@
           <a:p>
             <a:fld id="{4E6EFC2C-8905-46F0-B443-CE905B76BA01}" type="datetime1">
               <a:rPr lang="en-US" smtClean="0"/>
-              <a:t>5/29/2022</a:t>
+              <a:t>8/28/2022</a:t>
             </a:fld>
             <a:endParaRPr lang="en-US" dirty="0"/>
           </a:p>
@@ -2851,7 +2851,7 @@
           <a:p>
             <a:fld id="{D9079DC3-C9B5-499E-9140-0DC28B7074E2}" type="datetime1">
               <a:rPr lang="en-US" smtClean="0"/>
-              <a:t>5/29/2022</a:t>
+              <a:t>8/28/2022</a:t>
             </a:fld>
             <a:endParaRPr lang="en-US" dirty="0"/>
           </a:p>
@@ -3733,7 +3733,7 @@
           <a:p>
             <a:fld id="{30BB33EA-E472-4D22-9C03-A9C14AA21CED}" type="datetime1">
               <a:rPr lang="en-US" smtClean="0"/>
-              <a:t>5/29/2022</a:t>
+              <a:t>8/28/2022</a:t>
             </a:fld>
             <a:endParaRPr lang="en-US" dirty="0"/>
           </a:p>
@@ -3903,7 +3903,7 @@
           <a:p>
             <a:fld id="{73C55A3C-5767-4844-A0A3-83778C2E5409}" type="datetime1">
               <a:rPr lang="en-US" smtClean="0"/>
-              <a:t>5/29/2022</a:t>
+              <a:t>8/28/2022</a:t>
             </a:fld>
             <a:endParaRPr lang="en-US" dirty="0"/>
           </a:p>
@@ -4147,7 +4147,7 @@
           <a:p>
             <a:fld id="{CAE507A8-A5CF-4D38-AB86-7EDDA87A85D4}" type="datetime1">
               <a:rPr lang="en-US" smtClean="0"/>
-              <a:t>5/29/2022</a:t>
+              <a:t>8/28/2022</a:t>
             </a:fld>
             <a:endParaRPr lang="en-US" dirty="0"/>
           </a:p>
@@ -4389,7 +4389,7 @@
           <a:p>
             <a:fld id="{BDFCD27C-8599-43EF-BA1D-14DDC1946E06}" type="datetime1">
               <a:rPr lang="en-US" smtClean="0"/>
-              <a:t>5/29/2022</a:t>
+              <a:t>8/28/2022</a:t>
             </a:fld>
             <a:endParaRPr lang="en-US" dirty="0"/>
           </a:p>
@@ -4872,7 +4872,7 @@
           <a:p>
             <a:fld id="{49343D99-809A-49C0-96E5-4250D0B498EE}" type="datetime1">
               <a:rPr lang="en-US" smtClean="0"/>
-              <a:t>5/29/2022</a:t>
+              <a:t>8/28/2022</a:t>
             </a:fld>
             <a:endParaRPr lang="en-US" dirty="0"/>
           </a:p>
@@ -4990,7 +4990,7 @@
           <a:p>
             <a:fld id="{A143DE9B-B678-4EFB-BB7D-A4370204A0B0}" type="datetime1">
               <a:rPr lang="en-US" smtClean="0"/>
-              <a:t>5/29/2022</a:t>
+              <a:t>8/28/2022</a:t>
             </a:fld>
             <a:endParaRPr lang="en-US" dirty="0"/>
           </a:p>
@@ -5085,7 +5085,7 @@
           <a:p>
             <a:fld id="{E68812DA-F765-4142-A6A3-A8ED7235E082}" type="datetime1">
               <a:rPr lang="en-US" smtClean="0"/>
-              <a:t>5/29/2022</a:t>
+              <a:t>8/28/2022</a:t>
             </a:fld>
             <a:endParaRPr lang="en-US" dirty="0"/>
           </a:p>
@@ -5340,7 +5340,7 @@
           <a:p>
             <a:fld id="{3E0277FD-7DE6-41D4-930D-AC99F5AFE54E}" type="datetime1">
               <a:rPr lang="en-US" smtClean="0"/>
-              <a:t>5/29/2022</a:t>
+              <a:t>8/28/2022</a:t>
             </a:fld>
             <a:endParaRPr lang="en-US" dirty="0"/>
           </a:p>
@@ -5647,7 +5647,7 @@
           <a:p>
             <a:fld id="{9EA15526-7079-4B7B-987C-1B5FAE11A0FF}" type="datetime1">
               <a:rPr lang="en-US" smtClean="0"/>
-              <a:t>5/29/2022</a:t>
+              <a:t>8/28/2022</a:t>
             </a:fld>
             <a:endParaRPr lang="en-US" dirty="0"/>
           </a:p>
@@ -5882,7 +5882,7 @@
           <a:p>
             <a:fld id="{073ED0CC-082F-4160-86E5-0D6041F12778}" type="datetime1">
               <a:rPr lang="en-US" smtClean="0"/>
-              <a:t>5/29/2022</a:t>
+              <a:t>8/28/2022</a:t>
             </a:fld>
             <a:endParaRPr lang="en-US" dirty="0"/>
           </a:p>
@@ -19212,7 +19212,7 @@
         </p:blipFill>
         <p:spPr>
           <a:xfrm>
-            <a:off x="630758" y="1523762"/>
+            <a:off x="644010" y="1523762"/>
             <a:ext cx="8194625" cy="4586751"/>
           </a:xfrm>
           <a:prstGeom prst="rect">
@@ -19756,7 +19756,7 @@
         </p:nvSpPr>
         <p:spPr>
           <a:xfrm>
-            <a:off x="10966595" y="5750246"/>
+            <a:off x="4686885" y="5675717"/>
             <a:ext cx="1186058" cy="658008"/>
           </a:xfrm>
           <a:prstGeom prst="rect">
@@ -20345,15 +20345,15 @@
           </p:cNvPr>
           <p:cNvCxnSpPr>
             <a:cxnSpLocks/>
-            <a:stCxn id="20" idx="2"/>
-            <a:endCxn id="7" idx="1"/>
+            <a:stCxn id="20" idx="1"/>
+            <a:endCxn id="7" idx="3"/>
           </p:cNvCxnSpPr>
           <p:nvPr/>
         </p:nvCxnSpPr>
         <p:spPr>
-          <a:xfrm flipH="1">
-            <a:off x="10966595" y="4555315"/>
-            <a:ext cx="306286" cy="1523935"/>
+          <a:xfrm flipH="1" flipV="1">
+            <a:off x="5872943" y="6004721"/>
+            <a:ext cx="1118278" cy="18124"/>
           </a:xfrm>
           <a:prstGeom prst="straightConnector1">
             <a:avLst/>
@@ -20460,7 +20460,7 @@
         </p:nvSpPr>
         <p:spPr>
           <a:xfrm>
-            <a:off x="10758986" y="4383865"/>
+            <a:off x="6991221" y="5937120"/>
             <a:ext cx="1027789" cy="171450"/>
           </a:xfrm>
           <a:prstGeom prst="rect">
@@ -20524,14 +20524,13 @@
           <p:cNvCxnSpPr>
             <a:cxnSpLocks/>
             <a:stCxn id="15" idx="3"/>
-            <a:endCxn id="20" idx="1"/>
           </p:cNvCxnSpPr>
           <p:nvPr/>
         </p:nvCxnSpPr>
         <p:spPr>
-          <a:xfrm flipV="1">
-            <a:off x="7505116" y="4469590"/>
-            <a:ext cx="3253870" cy="543510"/>
+          <a:xfrm>
+            <a:off x="7505116" y="5013100"/>
+            <a:ext cx="0" cy="876256"/>
           </a:xfrm>
           <a:prstGeom prst="straightConnector1">
             <a:avLst/>
@@ -21337,8 +21336,8 @@
         </p:nvSpPr>
         <p:spPr>
           <a:xfrm>
-            <a:off x="2092569" y="3701311"/>
-            <a:ext cx="947781" cy="874911"/>
+            <a:off x="2030506" y="3701311"/>
+            <a:ext cx="1062317" cy="884136"/>
           </a:xfrm>
           <a:prstGeom prst="rect">
             <a:avLst/>
@@ -22931,7 +22930,7 @@
         <p:spPr>
           <a:xfrm>
             <a:off x="645059" y="2062369"/>
-            <a:ext cx="10891234" cy="3701087"/>
+            <a:ext cx="10891234" cy="3935019"/>
           </a:xfrm>
           <a:prstGeom prst="rect">
             <a:avLst/>
@@ -23676,6 +23675,412 @@
           </a:fontRef>
         </p:style>
       </p:cxnSp>
+      <mc:AlternateContent xmlns:mc="http://schemas.openxmlformats.org/markup-compatibility/2006">
+        <mc:Choice xmlns:a14="http://schemas.microsoft.com/office/drawing/2010/main" Requires="a14">
+          <p:sp>
+            <p:nvSpPr>
+              <p:cNvPr id="3" name="TextBox 2">
+                <a:extLst>
+                  <a:ext uri="{FF2B5EF4-FFF2-40B4-BE49-F238E27FC236}">
+                    <a16:creationId xmlns:a16="http://schemas.microsoft.com/office/drawing/2014/main" id="{9F139EF4-0F65-773A-D75A-8388FFF58F57}"/>
+                  </a:ext>
+                </a:extLst>
+              </p:cNvPr>
+              <p:cNvSpPr txBox="1"/>
+              <p:nvPr/>
+            </p:nvSpPr>
+            <p:spPr>
+              <a:xfrm>
+                <a:off x="6762696" y="5638942"/>
+                <a:ext cx="4561313" cy="276999"/>
+              </a:xfrm>
+              <a:prstGeom prst="rect">
+                <a:avLst/>
+              </a:prstGeom>
+              <a:noFill/>
+            </p:spPr>
+            <p:txBody>
+              <a:bodyPr wrap="square" lIns="0" tIns="0" rIns="0" bIns="0" rtlCol="0">
+                <a:spAutoFit/>
+              </a:bodyPr>
+              <a:lstStyle/>
+              <a:p>
+                <a:pPr/>
+                <a14:m>
+                  <m:oMathPara xmlns:m="http://schemas.openxmlformats.org/officeDocument/2006/math">
+                    <m:oMathParaPr>
+                      <m:jc m:val="centerGroup"/>
+                    </m:oMathParaPr>
+                    <m:oMath xmlns:m="http://schemas.openxmlformats.org/officeDocument/2006/math">
+                      <m:r>
+                        <a:rPr lang="it-IT" b="0" i="1" smtClean="0">
+                          <a:solidFill>
+                            <a:schemeClr val="bg1"/>
+                          </a:solidFill>
+                          <a:latin typeface="Cambria Math" panose="02040503050406030204" pitchFamily="18" charset="0"/>
+                        </a:rPr>
+                        <m:t>𝑦</m:t>
+                      </m:r>
+                      <m:r>
+                        <a:rPr lang="it-IT" b="0" i="1" smtClean="0">
+                          <a:solidFill>
+                            <a:schemeClr val="bg1"/>
+                          </a:solidFill>
+                          <a:latin typeface="Cambria Math" panose="02040503050406030204" pitchFamily="18" charset="0"/>
+                        </a:rPr>
+                        <m:t>=</m:t>
+                      </m:r>
+                      <m:r>
+                        <a:rPr lang="it-IT" b="0" i="1" smtClean="0">
+                          <a:solidFill>
+                            <a:schemeClr val="bg1"/>
+                          </a:solidFill>
+                          <a:latin typeface="Cambria Math" panose="02040503050406030204" pitchFamily="18" charset="0"/>
+                        </a:rPr>
+                        <m:t>𝜙</m:t>
+                      </m:r>
+                      <m:r>
+                        <a:rPr lang="it-IT" b="0" i="1" smtClean="0">
+                          <a:solidFill>
+                            <a:schemeClr val="bg1"/>
+                          </a:solidFill>
+                          <a:latin typeface="Cambria Math" panose="02040503050406030204" pitchFamily="18" charset="0"/>
+                        </a:rPr>
+                        <m:t>(</m:t>
+                      </m:r>
+                      <m:sSub>
+                        <m:sSubPr>
+                          <m:ctrlPr>
+                            <a:rPr lang="it-IT" b="0" i="1" smtClean="0">
+                              <a:solidFill>
+                                <a:schemeClr val="bg1"/>
+                              </a:solidFill>
+                              <a:latin typeface="Cambria Math" panose="02040503050406030204" pitchFamily="18" charset="0"/>
+                            </a:rPr>
+                          </m:ctrlPr>
+                        </m:sSubPr>
+                        <m:e>
+                          <m:r>
+                            <a:rPr lang="it-IT" b="0" i="1" smtClean="0">
+                              <a:solidFill>
+                                <a:schemeClr val="bg1"/>
+                              </a:solidFill>
+                              <a:latin typeface="Cambria Math" panose="02040503050406030204" pitchFamily="18" charset="0"/>
+                            </a:rPr>
+                            <m:t>𝑥</m:t>
+                          </m:r>
+                        </m:e>
+                        <m:sub>
+                          <m:r>
+                            <a:rPr lang="it-IT" b="0" i="1" smtClean="0">
+                              <a:solidFill>
+                                <a:schemeClr val="bg1"/>
+                              </a:solidFill>
+                              <a:latin typeface="Cambria Math" panose="02040503050406030204" pitchFamily="18" charset="0"/>
+                            </a:rPr>
+                            <m:t>1</m:t>
+                          </m:r>
+                        </m:sub>
+                      </m:sSub>
+                      <m:r>
+                        <a:rPr lang="it-IT" b="0" i="1" smtClean="0">
+                          <a:solidFill>
+                            <a:schemeClr val="bg1"/>
+                          </a:solidFill>
+                          <a:latin typeface="Cambria Math" panose="02040503050406030204" pitchFamily="18" charset="0"/>
+                        </a:rPr>
+                        <m:t>∗</m:t>
+                      </m:r>
+                      <m:sSub>
+                        <m:sSubPr>
+                          <m:ctrlPr>
+                            <a:rPr lang="it-IT" b="0" i="1" smtClean="0">
+                              <a:solidFill>
+                                <a:schemeClr val="bg1"/>
+                              </a:solidFill>
+                              <a:latin typeface="Cambria Math" panose="02040503050406030204" pitchFamily="18" charset="0"/>
+                            </a:rPr>
+                          </m:ctrlPr>
+                        </m:sSubPr>
+                        <m:e>
+                          <m:r>
+                            <a:rPr lang="it-IT" b="0" i="1" smtClean="0">
+                              <a:solidFill>
+                                <a:schemeClr val="bg1"/>
+                              </a:solidFill>
+                              <a:latin typeface="Cambria Math" panose="02040503050406030204" pitchFamily="18" charset="0"/>
+                            </a:rPr>
+                            <m:t>𝑤</m:t>
+                          </m:r>
+                        </m:e>
+                        <m:sub>
+                          <m:r>
+                            <a:rPr lang="it-IT" b="0" i="1" smtClean="0">
+                              <a:solidFill>
+                                <a:schemeClr val="bg1"/>
+                              </a:solidFill>
+                              <a:latin typeface="Cambria Math" panose="02040503050406030204" pitchFamily="18" charset="0"/>
+                            </a:rPr>
+                            <m:t>1</m:t>
+                          </m:r>
+                        </m:sub>
+                      </m:sSub>
+                      <m:r>
+                        <a:rPr lang="it-IT" b="0" i="1" smtClean="0">
+                          <a:solidFill>
+                            <a:schemeClr val="bg1"/>
+                          </a:solidFill>
+                          <a:latin typeface="Cambria Math" panose="02040503050406030204" pitchFamily="18" charset="0"/>
+                        </a:rPr>
+                        <m:t>+</m:t>
+                      </m:r>
+                      <m:sSub>
+                        <m:sSubPr>
+                          <m:ctrlPr>
+                            <a:rPr lang="it-IT" b="0" i="1" smtClean="0">
+                              <a:solidFill>
+                                <a:schemeClr val="bg1"/>
+                              </a:solidFill>
+                              <a:latin typeface="Cambria Math" panose="02040503050406030204" pitchFamily="18" charset="0"/>
+                            </a:rPr>
+                          </m:ctrlPr>
+                        </m:sSubPr>
+                        <m:e>
+                          <m:r>
+                            <a:rPr lang="it-IT" b="0" i="1" smtClean="0">
+                              <a:solidFill>
+                                <a:schemeClr val="bg1"/>
+                              </a:solidFill>
+                              <a:latin typeface="Cambria Math" panose="02040503050406030204" pitchFamily="18" charset="0"/>
+                            </a:rPr>
+                            <m:t>𝑥</m:t>
+                          </m:r>
+                        </m:e>
+                        <m:sub>
+                          <m:r>
+                            <a:rPr lang="it-IT" b="0" i="1" smtClean="0">
+                              <a:solidFill>
+                                <a:schemeClr val="bg1"/>
+                              </a:solidFill>
+                              <a:latin typeface="Cambria Math" panose="02040503050406030204" pitchFamily="18" charset="0"/>
+                            </a:rPr>
+                            <m:t>2</m:t>
+                          </m:r>
+                        </m:sub>
+                      </m:sSub>
+                      <m:r>
+                        <a:rPr lang="it-IT" b="0" i="1" smtClean="0">
+                          <a:solidFill>
+                            <a:schemeClr val="bg1"/>
+                          </a:solidFill>
+                          <a:latin typeface="Cambria Math" panose="02040503050406030204" pitchFamily="18" charset="0"/>
+                        </a:rPr>
+                        <m:t>∗</m:t>
+                      </m:r>
+                      <m:sSub>
+                        <m:sSubPr>
+                          <m:ctrlPr>
+                            <a:rPr lang="it-IT" b="0" i="1" smtClean="0">
+                              <a:solidFill>
+                                <a:schemeClr val="bg1"/>
+                              </a:solidFill>
+                              <a:latin typeface="Cambria Math" panose="02040503050406030204" pitchFamily="18" charset="0"/>
+                            </a:rPr>
+                          </m:ctrlPr>
+                        </m:sSubPr>
+                        <m:e>
+                          <m:r>
+                            <a:rPr lang="it-IT" b="0" i="1" smtClean="0">
+                              <a:solidFill>
+                                <a:schemeClr val="bg1"/>
+                              </a:solidFill>
+                              <a:latin typeface="Cambria Math" panose="02040503050406030204" pitchFamily="18" charset="0"/>
+                            </a:rPr>
+                            <m:t>𝑤</m:t>
+                          </m:r>
+                        </m:e>
+                        <m:sub>
+                          <m:r>
+                            <a:rPr lang="it-IT" b="0" i="1" smtClean="0">
+                              <a:solidFill>
+                                <a:schemeClr val="bg1"/>
+                              </a:solidFill>
+                              <a:latin typeface="Cambria Math" panose="02040503050406030204" pitchFamily="18" charset="0"/>
+                            </a:rPr>
+                            <m:t>2</m:t>
+                          </m:r>
+                        </m:sub>
+                      </m:sSub>
+                      <m:r>
+                        <a:rPr lang="it-IT" b="0" i="1" smtClean="0">
+                          <a:solidFill>
+                            <a:schemeClr val="bg1"/>
+                          </a:solidFill>
+                          <a:latin typeface="Cambria Math" panose="02040503050406030204" pitchFamily="18" charset="0"/>
+                        </a:rPr>
+                        <m:t>+…+</m:t>
+                      </m:r>
+                      <m:sSub>
+                        <m:sSubPr>
+                          <m:ctrlPr>
+                            <a:rPr lang="it-IT" b="0" i="1" smtClean="0">
+                              <a:solidFill>
+                                <a:schemeClr val="bg1"/>
+                              </a:solidFill>
+                              <a:latin typeface="Cambria Math" panose="02040503050406030204" pitchFamily="18" charset="0"/>
+                            </a:rPr>
+                          </m:ctrlPr>
+                        </m:sSubPr>
+                        <m:e>
+                          <m:r>
+                            <a:rPr lang="it-IT" b="0" i="1" smtClean="0">
+                              <a:solidFill>
+                                <a:schemeClr val="bg1"/>
+                              </a:solidFill>
+                              <a:latin typeface="Cambria Math" panose="02040503050406030204" pitchFamily="18" charset="0"/>
+                            </a:rPr>
+                            <m:t>𝑥</m:t>
+                          </m:r>
+                        </m:e>
+                        <m:sub>
+                          <m:r>
+                            <a:rPr lang="it-IT" b="0" i="1" smtClean="0">
+                              <a:solidFill>
+                                <a:schemeClr val="bg1"/>
+                              </a:solidFill>
+                              <a:latin typeface="Cambria Math" panose="02040503050406030204" pitchFamily="18" charset="0"/>
+                            </a:rPr>
+                            <m:t>𝑚</m:t>
+                          </m:r>
+                        </m:sub>
+                      </m:sSub>
+                      <m:r>
+                        <a:rPr lang="it-IT" b="0" i="1" smtClean="0">
+                          <a:solidFill>
+                            <a:schemeClr val="bg1"/>
+                          </a:solidFill>
+                          <a:latin typeface="Cambria Math" panose="02040503050406030204" pitchFamily="18" charset="0"/>
+                        </a:rPr>
+                        <m:t> ∗</m:t>
+                      </m:r>
+                      <m:sSub>
+                        <m:sSubPr>
+                          <m:ctrlPr>
+                            <a:rPr lang="it-IT" b="0" i="1" smtClean="0">
+                              <a:solidFill>
+                                <a:schemeClr val="bg1"/>
+                              </a:solidFill>
+                              <a:latin typeface="Cambria Math" panose="02040503050406030204" pitchFamily="18" charset="0"/>
+                            </a:rPr>
+                          </m:ctrlPr>
+                        </m:sSubPr>
+                        <m:e>
+                          <m:r>
+                            <a:rPr lang="it-IT" b="0" i="1" smtClean="0">
+                              <a:solidFill>
+                                <a:schemeClr val="bg1"/>
+                              </a:solidFill>
+                              <a:latin typeface="Cambria Math" panose="02040503050406030204" pitchFamily="18" charset="0"/>
+                            </a:rPr>
+                            <m:t>𝑤</m:t>
+                          </m:r>
+                        </m:e>
+                        <m:sub>
+                          <m:r>
+                            <a:rPr lang="it-IT" b="0" i="1" smtClean="0">
+                              <a:solidFill>
+                                <a:schemeClr val="bg1"/>
+                              </a:solidFill>
+                              <a:latin typeface="Cambria Math" panose="02040503050406030204" pitchFamily="18" charset="0"/>
+                            </a:rPr>
+                            <m:t>𝑚</m:t>
+                          </m:r>
+                        </m:sub>
+                      </m:sSub>
+                      <m:r>
+                        <a:rPr lang="it-IT" b="0" i="1" smtClean="0">
+                          <a:solidFill>
+                            <a:schemeClr val="bg1"/>
+                          </a:solidFill>
+                          <a:latin typeface="Cambria Math" panose="02040503050406030204" pitchFamily="18" charset="0"/>
+                        </a:rPr>
+                        <m:t>+</m:t>
+                      </m:r>
+                      <m:r>
+                        <a:rPr lang="it-IT" b="0" i="1" smtClean="0">
+                          <a:solidFill>
+                            <a:schemeClr val="bg1"/>
+                          </a:solidFill>
+                          <a:latin typeface="Cambria Math" panose="02040503050406030204" pitchFamily="18" charset="0"/>
+                        </a:rPr>
+                        <m:t>𝑏</m:t>
+                      </m:r>
+                      <m:r>
+                        <a:rPr lang="it-IT" b="0" i="1" smtClean="0">
+                          <a:solidFill>
+                            <a:schemeClr val="bg1"/>
+                          </a:solidFill>
+                          <a:latin typeface="Cambria Math" panose="02040503050406030204" pitchFamily="18" charset="0"/>
+                        </a:rPr>
+                        <m:t>)</m:t>
+                      </m:r>
+                    </m:oMath>
+                  </m:oMathPara>
+                </a14:m>
+                <a:endParaRPr lang="en-US" dirty="0">
+                  <a:solidFill>
+                    <a:schemeClr val="bg1"/>
+                  </a:solidFill>
+                </a:endParaRPr>
+              </a:p>
+            </p:txBody>
+          </p:sp>
+        </mc:Choice>
+        <mc:Fallback>
+          <p:sp>
+            <p:nvSpPr>
+              <p:cNvPr id="3" name="TextBox 2">
+                <a:extLst>
+                  <a:ext uri="{FF2B5EF4-FFF2-40B4-BE49-F238E27FC236}">
+                    <a16:creationId xmlns:a16="http://schemas.microsoft.com/office/drawing/2014/main" id="{9F139EF4-0F65-773A-D75A-8388FFF58F57}"/>
+                  </a:ext>
+                </a:extLst>
+              </p:cNvPr>
+              <p:cNvSpPr txBox="1">
+                <a:spLocks noRot="1" noChangeAspect="1" noMove="1" noResize="1" noEditPoints="1" noAdjustHandles="1" noChangeArrowheads="1" noChangeShapeType="1" noTextEdit="1"/>
+              </p:cNvSpPr>
+              <p:nvPr/>
+            </p:nvSpPr>
+            <p:spPr>
+              <a:xfrm>
+                <a:off x="6762696" y="5638942"/>
+                <a:ext cx="4561313" cy="276999"/>
+              </a:xfrm>
+              <a:prstGeom prst="rect">
+                <a:avLst/>
+              </a:prstGeom>
+              <a:blipFill>
+                <a:blip r:embed="rId3"/>
+                <a:stretch>
+                  <a:fillRect l="-801" t="-2222" r="-1202" b="-35556"/>
+                </a:stretch>
+              </a:blipFill>
+            </p:spPr>
+            <p:txBody>
+              <a:bodyPr/>
+              <a:lstStyle/>
+              <a:p>
+                <a:r>
+                  <a:rPr lang="en-US">
+                    <a:noFill/>
+                  </a:rPr>
+                  <a:t> </a:t>
+                </a:r>
+              </a:p>
+            </p:txBody>
+          </p:sp>
+        </mc:Fallback>
+      </mc:AlternateContent>
     </p:spTree>
     <p:extLst>
       <p:ext uri="{BB962C8B-B14F-4D97-AF65-F5344CB8AC3E}">
@@ -24197,12 +24602,8 @@
           <a:lstStyle/>
           <a:p>
             <a:r>
-              <a:rPr lang="it-IT" dirty="0" err="1"/>
-              <a:t>Grouping</a:t>
-            </a:r>
-            <a:r>
               <a:rPr lang="it-IT" dirty="0"/>
-              <a:t> data </a:t>
+              <a:t>NV_REG CONTENT</a:t>
             </a:r>
             <a:endParaRPr lang="en-US" dirty="0"/>
           </a:p>
@@ -24262,332 +24663,6 @@
       </p:sp>
       <p:sp>
         <p:nvSpPr>
-          <p:cNvPr id="6" name="Rectangle 5">
-            <a:extLst>
-              <a:ext uri="{FF2B5EF4-FFF2-40B4-BE49-F238E27FC236}">
-                <a16:creationId xmlns:a16="http://schemas.microsoft.com/office/drawing/2014/main" id="{1FB71181-2783-5CA5-F6E7-BD1F46ED450C}"/>
-              </a:ext>
-            </a:extLst>
-          </p:cNvPr>
-          <p:cNvSpPr/>
-          <p:nvPr/>
-        </p:nvSpPr>
-        <p:spPr>
-          <a:xfrm>
-            <a:off x="1164081" y="1719167"/>
-            <a:ext cx="3220883" cy="2358887"/>
-          </a:xfrm>
-          <a:prstGeom prst="rect">
-            <a:avLst/>
-          </a:prstGeom>
-        </p:spPr>
-        <p:style>
-          <a:lnRef idx="2">
-            <a:schemeClr val="accent1">
-              <a:shade val="50000"/>
-            </a:schemeClr>
-          </a:lnRef>
-          <a:fillRef idx="1">
-            <a:schemeClr val="accent1"/>
-          </a:fillRef>
-          <a:effectRef idx="0">
-            <a:schemeClr val="accent1"/>
-          </a:effectRef>
-          <a:fontRef idx="minor">
-            <a:schemeClr val="lt1"/>
-          </a:fontRef>
-        </p:style>
-        <p:txBody>
-          <a:bodyPr rtlCol="0" anchor="ctr"/>
-          <a:lstStyle/>
-          <a:p>
-            <a:pPr algn="ctr"/>
-            <a:endParaRPr lang="en-US" dirty="0"/>
-          </a:p>
-        </p:txBody>
-      </p:sp>
-      <p:sp>
-        <p:nvSpPr>
-          <p:cNvPr id="7" name="TextBox 6">
-            <a:extLst>
-              <a:ext uri="{FF2B5EF4-FFF2-40B4-BE49-F238E27FC236}">
-                <a16:creationId xmlns:a16="http://schemas.microsoft.com/office/drawing/2014/main" id="{0F0FEDDF-0C57-ECC2-FE13-131C19CA802B}"/>
-              </a:ext>
-            </a:extLst>
-          </p:cNvPr>
-          <p:cNvSpPr txBox="1"/>
-          <p:nvPr/>
-        </p:nvSpPr>
-        <p:spPr>
-          <a:xfrm>
-            <a:off x="1164081" y="1704803"/>
-            <a:ext cx="3220883" cy="369332"/>
-          </a:xfrm>
-          <a:prstGeom prst="rect">
-            <a:avLst/>
-          </a:prstGeom>
-          <a:noFill/>
-        </p:spPr>
-        <p:txBody>
-          <a:bodyPr wrap="square" rtlCol="0">
-            <a:spAutoFit/>
-          </a:bodyPr>
-          <a:lstStyle/>
-          <a:p>
-            <a:pPr algn="ctr"/>
-            <a:r>
-              <a:rPr lang="it-IT" dirty="0">
-                <a:solidFill>
-                  <a:schemeClr val="bg1"/>
-                </a:solidFill>
-              </a:rPr>
-              <a:t>DATA BACKUP</a:t>
-            </a:r>
-            <a:endParaRPr lang="en-US" dirty="0">
-              <a:solidFill>
-                <a:schemeClr val="bg1"/>
-              </a:solidFill>
-            </a:endParaRPr>
-          </a:p>
-        </p:txBody>
-      </p:sp>
-      <p:sp>
-        <p:nvSpPr>
-          <p:cNvPr id="8" name="TextBox 7">
-            <a:extLst>
-              <a:ext uri="{FF2B5EF4-FFF2-40B4-BE49-F238E27FC236}">
-                <a16:creationId xmlns:a16="http://schemas.microsoft.com/office/drawing/2014/main" id="{4341E295-36AC-559D-B20C-6440FF569C5F}"/>
-              </a:ext>
-            </a:extLst>
-          </p:cNvPr>
-          <p:cNvSpPr txBox="1"/>
-          <p:nvPr/>
-        </p:nvSpPr>
-        <p:spPr>
-          <a:xfrm>
-            <a:off x="1164081" y="2074135"/>
-            <a:ext cx="3220883" cy="1754326"/>
-          </a:xfrm>
-          <a:prstGeom prst="rect">
-            <a:avLst/>
-          </a:prstGeom>
-          <a:noFill/>
-        </p:spPr>
-        <p:txBody>
-          <a:bodyPr wrap="square" rtlCol="0">
-            <a:spAutoFit/>
-          </a:bodyPr>
-          <a:lstStyle/>
-          <a:p>
-            <a:pPr algn="ctr"/>
-            <a:r>
-              <a:rPr lang="it-IT" dirty="0"/>
-              <a:t>W_SUM_SAVE_0</a:t>
-            </a:r>
-          </a:p>
-          <a:p>
-            <a:pPr algn="ctr"/>
-            <a:r>
-              <a:rPr lang="it-IT" dirty="0"/>
-              <a:t>.</a:t>
-            </a:r>
-          </a:p>
-          <a:p>
-            <a:pPr algn="ctr"/>
-            <a:r>
-              <a:rPr lang="it-IT" dirty="0"/>
-              <a:t>.</a:t>
-            </a:r>
-          </a:p>
-          <a:p>
-            <a:pPr algn="ctr"/>
-            <a:r>
-              <a:rPr lang="it-IT" dirty="0"/>
-              <a:t>W_SUM_SAVE_(P-1)</a:t>
-            </a:r>
-          </a:p>
-          <a:p>
-            <a:pPr algn="ctr"/>
-            <a:r>
-              <a:rPr lang="it-IT" dirty="0"/>
-              <a:t>FSM_STATE_SAVE</a:t>
-            </a:r>
-          </a:p>
-          <a:p>
-            <a:pPr algn="ctr"/>
-            <a:r>
-              <a:rPr lang="it-IT" dirty="0"/>
-              <a:t>ADDR_GEN_SAVE</a:t>
-            </a:r>
-            <a:endParaRPr lang="en-US" dirty="0"/>
-          </a:p>
-        </p:txBody>
-      </p:sp>
-      <p:sp>
-        <p:nvSpPr>
-          <p:cNvPr id="9" name="Rectangle 8">
-            <a:extLst>
-              <a:ext uri="{FF2B5EF4-FFF2-40B4-BE49-F238E27FC236}">
-                <a16:creationId xmlns:a16="http://schemas.microsoft.com/office/drawing/2014/main" id="{E328DD1F-C042-E386-3CE2-780A73E9CD5B}"/>
-              </a:ext>
-            </a:extLst>
-          </p:cNvPr>
-          <p:cNvSpPr/>
-          <p:nvPr/>
-        </p:nvSpPr>
-        <p:spPr>
-          <a:xfrm>
-            <a:off x="1164081" y="4231301"/>
-            <a:ext cx="3220883" cy="2358887"/>
-          </a:xfrm>
-          <a:prstGeom prst="rect">
-            <a:avLst/>
-          </a:prstGeom>
-        </p:spPr>
-        <p:style>
-          <a:lnRef idx="2">
-            <a:schemeClr val="accent1">
-              <a:shade val="50000"/>
-            </a:schemeClr>
-          </a:lnRef>
-          <a:fillRef idx="1">
-            <a:schemeClr val="accent1"/>
-          </a:fillRef>
-          <a:effectRef idx="0">
-            <a:schemeClr val="accent1"/>
-          </a:effectRef>
-          <a:fontRef idx="minor">
-            <a:schemeClr val="lt1"/>
-          </a:fontRef>
-        </p:style>
-        <p:txBody>
-          <a:bodyPr rtlCol="0" anchor="ctr"/>
-          <a:lstStyle/>
-          <a:p>
-            <a:pPr algn="ctr"/>
-            <a:endParaRPr lang="en-US" dirty="0"/>
-          </a:p>
-        </p:txBody>
-      </p:sp>
-      <p:sp>
-        <p:nvSpPr>
-          <p:cNvPr id="10" name="TextBox 9">
-            <a:extLst>
-              <a:ext uri="{FF2B5EF4-FFF2-40B4-BE49-F238E27FC236}">
-                <a16:creationId xmlns:a16="http://schemas.microsoft.com/office/drawing/2014/main" id="{FCE5711A-08E9-9D7C-92ED-F908F675407C}"/>
-              </a:ext>
-            </a:extLst>
-          </p:cNvPr>
-          <p:cNvSpPr txBox="1"/>
-          <p:nvPr/>
-        </p:nvSpPr>
-        <p:spPr>
-          <a:xfrm>
-            <a:off x="1164081" y="4231301"/>
-            <a:ext cx="3220883" cy="369332"/>
-          </a:xfrm>
-          <a:prstGeom prst="rect">
-            <a:avLst/>
-          </a:prstGeom>
-          <a:noFill/>
-        </p:spPr>
-        <p:txBody>
-          <a:bodyPr wrap="square" rtlCol="0">
-            <a:spAutoFit/>
-          </a:bodyPr>
-          <a:lstStyle/>
-          <a:p>
-            <a:pPr algn="ctr"/>
-            <a:r>
-              <a:rPr lang="it-IT" dirty="0">
-                <a:solidFill>
-                  <a:schemeClr val="bg1"/>
-                </a:solidFill>
-              </a:rPr>
-              <a:t>DATA SAVE</a:t>
-            </a:r>
-            <a:endParaRPr lang="en-US" dirty="0">
-              <a:solidFill>
-                <a:schemeClr val="bg1"/>
-              </a:solidFill>
-            </a:endParaRPr>
-          </a:p>
-        </p:txBody>
-      </p:sp>
-      <p:sp>
-        <p:nvSpPr>
-          <p:cNvPr id="11" name="TextBox 10">
-            <a:extLst>
-              <a:ext uri="{FF2B5EF4-FFF2-40B4-BE49-F238E27FC236}">
-                <a16:creationId xmlns:a16="http://schemas.microsoft.com/office/drawing/2014/main" id="{F51476B9-245D-E786-BC88-24B34B33E77A}"/>
-              </a:ext>
-            </a:extLst>
-          </p:cNvPr>
-          <p:cNvSpPr txBox="1"/>
-          <p:nvPr/>
-        </p:nvSpPr>
-        <p:spPr>
-          <a:xfrm>
-            <a:off x="1164081" y="4600633"/>
-            <a:ext cx="3220883" cy="1754326"/>
-          </a:xfrm>
-          <a:prstGeom prst="rect">
-            <a:avLst/>
-          </a:prstGeom>
-          <a:noFill/>
-        </p:spPr>
-        <p:txBody>
-          <a:bodyPr wrap="square" rtlCol="0">
-            <a:spAutoFit/>
-          </a:bodyPr>
-          <a:lstStyle/>
-          <a:p>
-            <a:pPr algn="ctr"/>
-            <a:r>
-              <a:rPr lang="it-IT" dirty="0"/>
-              <a:t>W_SUM_REC_0</a:t>
-            </a:r>
-          </a:p>
-          <a:p>
-            <a:pPr algn="ctr"/>
-            <a:r>
-              <a:rPr lang="it-IT" dirty="0"/>
-              <a:t>.</a:t>
-            </a:r>
-          </a:p>
-          <a:p>
-            <a:pPr algn="ctr"/>
-            <a:r>
-              <a:rPr lang="it-IT" dirty="0"/>
-              <a:t>.</a:t>
-            </a:r>
-          </a:p>
-          <a:p>
-            <a:pPr algn="ctr"/>
-            <a:r>
-              <a:rPr lang="it-IT" dirty="0"/>
-              <a:t>W_SUM_REC_(P-1)</a:t>
-            </a:r>
-          </a:p>
-          <a:p>
-            <a:pPr algn="ctr"/>
-            <a:r>
-              <a:rPr lang="it-IT" dirty="0"/>
-              <a:t>FSM_REC_SAVE</a:t>
-            </a:r>
-          </a:p>
-          <a:p>
-            <a:pPr algn="ctr"/>
-            <a:r>
-              <a:rPr lang="it-IT" dirty="0"/>
-              <a:t>ADDR_GEN_REC</a:t>
-            </a:r>
-            <a:endParaRPr lang="en-US" dirty="0"/>
-          </a:p>
-        </p:txBody>
-      </p:sp>
-      <p:sp>
-        <p:nvSpPr>
           <p:cNvPr id="12" name="TextBox 11">
             <a:extLst>
               <a:ext uri="{FF2B5EF4-FFF2-40B4-BE49-F238E27FC236}">
@@ -24600,8 +24675,8 @@
         </p:nvSpPr>
         <p:spPr>
           <a:xfrm>
-            <a:off x="1260539" y="1207777"/>
-            <a:ext cx="2968487" cy="369332"/>
+            <a:off x="919119" y="1303311"/>
+            <a:ext cx="1672867" cy="369332"/>
           </a:xfrm>
           <a:prstGeom prst="rect">
             <a:avLst/>
@@ -24621,7 +24696,7 @@
                   <a:schemeClr val="bg1"/>
                 </a:solidFill>
               </a:rPr>
-              <a:t>CURRENTLY ACTIVE</a:t>
+              <a:t>NOTHING</a:t>
             </a:r>
             <a:endParaRPr lang="en-US" dirty="0">
               <a:solidFill>
@@ -24633,56 +24708,10 @@
       </p:sp>
       <p:sp>
         <p:nvSpPr>
-          <p:cNvPr id="21" name="Rectangle 20">
+          <p:cNvPr id="15" name="TextBox 14">
             <a:extLst>
               <a:ext uri="{FF2B5EF4-FFF2-40B4-BE49-F238E27FC236}">
-                <a16:creationId xmlns:a16="http://schemas.microsoft.com/office/drawing/2014/main" id="{3C81EE1B-341B-A0AA-019F-7B247AEBF2C6}"/>
-              </a:ext>
-            </a:extLst>
-          </p:cNvPr>
-          <p:cNvSpPr/>
-          <p:nvPr/>
-        </p:nvSpPr>
-        <p:spPr>
-          <a:xfrm>
-            <a:off x="4864898" y="1733206"/>
-            <a:ext cx="3220883" cy="2358887"/>
-          </a:xfrm>
-          <a:prstGeom prst="rect">
-            <a:avLst/>
-          </a:prstGeom>
-        </p:spPr>
-        <p:style>
-          <a:lnRef idx="2">
-            <a:schemeClr val="accent1">
-              <a:shade val="50000"/>
-            </a:schemeClr>
-          </a:lnRef>
-          <a:fillRef idx="1">
-            <a:schemeClr val="accent1"/>
-          </a:fillRef>
-          <a:effectRef idx="0">
-            <a:schemeClr val="accent1"/>
-          </a:effectRef>
-          <a:fontRef idx="minor">
-            <a:schemeClr val="lt1"/>
-          </a:fontRef>
-        </p:style>
-        <p:txBody>
-          <a:bodyPr rtlCol="0" anchor="ctr"/>
-          <a:lstStyle/>
-          <a:p>
-            <a:pPr algn="ctr"/>
-            <a:endParaRPr lang="en-US" dirty="0"/>
-          </a:p>
-        </p:txBody>
-      </p:sp>
-      <p:sp>
-        <p:nvSpPr>
-          <p:cNvPr id="22" name="TextBox 21">
-            <a:extLst>
-              <a:ext uri="{FF2B5EF4-FFF2-40B4-BE49-F238E27FC236}">
-                <a16:creationId xmlns:a16="http://schemas.microsoft.com/office/drawing/2014/main" id="{D0AFDC79-2DF4-EAD5-B502-7D329F6DAA23}"/>
+                <a16:creationId xmlns:a16="http://schemas.microsoft.com/office/drawing/2014/main" id="{C52DFEB0-2C09-E196-72E0-871559F1C456}"/>
               </a:ext>
             </a:extLst>
           </p:cNvPr>
@@ -24691,8 +24720,8 @@
         </p:nvSpPr>
         <p:spPr>
           <a:xfrm>
-            <a:off x="4864898" y="1718842"/>
-            <a:ext cx="3220883" cy="369332"/>
+            <a:off x="4927918" y="1303311"/>
+            <a:ext cx="1672867" cy="369332"/>
           </a:xfrm>
           <a:prstGeom prst="rect">
             <a:avLst/>
@@ -24712,7 +24741,7 @@
                   <a:schemeClr val="bg1"/>
                 </a:solidFill>
               </a:rPr>
-              <a:t>DATA BACKUP</a:t>
+              <a:t>OUTPUT</a:t>
             </a:r>
             <a:endParaRPr lang="en-US" dirty="0">
               <a:solidFill>
@@ -24724,10 +24753,10 @@
       </p:sp>
       <p:sp>
         <p:nvSpPr>
-          <p:cNvPr id="23" name="TextBox 22">
+          <p:cNvPr id="16" name="TextBox 15">
             <a:extLst>
               <a:ext uri="{FF2B5EF4-FFF2-40B4-BE49-F238E27FC236}">
-                <a16:creationId xmlns:a16="http://schemas.microsoft.com/office/drawing/2014/main" id="{9A5BEC2B-D56E-BE60-5CD2-0015092D040D}"/>
+                <a16:creationId xmlns:a16="http://schemas.microsoft.com/office/drawing/2014/main" id="{2D192895-0189-9943-23AB-9C0AA59CBB0A}"/>
               </a:ext>
             </a:extLst>
           </p:cNvPr>
@@ -24736,8 +24765,8 @@
         </p:nvSpPr>
         <p:spPr>
           <a:xfrm>
-            <a:off x="4864898" y="2088174"/>
-            <a:ext cx="3220883" cy="1200329"/>
+            <a:off x="8839618" y="1303311"/>
+            <a:ext cx="1672867" cy="369332"/>
           </a:xfrm>
           <a:prstGeom prst="rect">
             <a:avLst/>
@@ -24752,115 +24781,12 @@
           <a:p>
             <a:pPr algn="ctr"/>
             <a:r>
-              <a:rPr lang="it-IT" dirty="0"/>
-              <a:t>N_OUTPUT_SAVE_0</a:t>
-            </a:r>
-          </a:p>
-          <a:p>
-            <a:pPr algn="ctr"/>
-            <a:r>
-              <a:rPr lang="it-IT" dirty="0"/>
-              <a:t>.</a:t>
-            </a:r>
-          </a:p>
-          <a:p>
-            <a:pPr algn="ctr"/>
-            <a:r>
-              <a:rPr lang="it-IT" dirty="0"/>
-              <a:t>.</a:t>
-            </a:r>
-          </a:p>
-          <a:p>
-            <a:pPr algn="ctr"/>
-            <a:r>
-              <a:rPr lang="it-IT" dirty="0"/>
-              <a:t>N_OUTPUT_SAVE_(P-1)</a:t>
-            </a:r>
-          </a:p>
-        </p:txBody>
-      </p:sp>
-      <p:sp>
-        <p:nvSpPr>
-          <p:cNvPr id="24" name="Rectangle 23">
-            <a:extLst>
-              <a:ext uri="{FF2B5EF4-FFF2-40B4-BE49-F238E27FC236}">
-                <a16:creationId xmlns:a16="http://schemas.microsoft.com/office/drawing/2014/main" id="{E035ED30-E2B7-CE84-4AD8-2FFD0FF46FFA}"/>
-              </a:ext>
-            </a:extLst>
-          </p:cNvPr>
-          <p:cNvSpPr/>
-          <p:nvPr/>
-        </p:nvSpPr>
-        <p:spPr>
-          <a:xfrm>
-            <a:off x="4864898" y="4245340"/>
-            <a:ext cx="3220883" cy="2358887"/>
-          </a:xfrm>
-          <a:prstGeom prst="rect">
-            <a:avLst/>
-          </a:prstGeom>
-        </p:spPr>
-        <p:style>
-          <a:lnRef idx="2">
-            <a:schemeClr val="accent1">
-              <a:shade val="50000"/>
-            </a:schemeClr>
-          </a:lnRef>
-          <a:fillRef idx="1">
-            <a:schemeClr val="accent1"/>
-          </a:fillRef>
-          <a:effectRef idx="0">
-            <a:schemeClr val="accent1"/>
-          </a:effectRef>
-          <a:fontRef idx="minor">
-            <a:schemeClr val="lt1"/>
-          </a:fontRef>
-        </p:style>
-        <p:txBody>
-          <a:bodyPr rtlCol="0" anchor="ctr"/>
-          <a:lstStyle/>
-          <a:p>
-            <a:pPr algn="ctr"/>
-            <a:endParaRPr lang="en-US" dirty="0"/>
-          </a:p>
-        </p:txBody>
-      </p:sp>
-      <p:sp>
-        <p:nvSpPr>
-          <p:cNvPr id="25" name="TextBox 24">
-            <a:extLst>
-              <a:ext uri="{FF2B5EF4-FFF2-40B4-BE49-F238E27FC236}">
-                <a16:creationId xmlns:a16="http://schemas.microsoft.com/office/drawing/2014/main" id="{8CA441F1-F021-98F8-1AF6-747803720116}"/>
-              </a:ext>
-            </a:extLst>
-          </p:cNvPr>
-          <p:cNvSpPr txBox="1"/>
-          <p:nvPr/>
-        </p:nvSpPr>
-        <p:spPr>
-          <a:xfrm>
-            <a:off x="4864898" y="4245340"/>
-            <a:ext cx="3220883" cy="369332"/>
-          </a:xfrm>
-          <a:prstGeom prst="rect">
-            <a:avLst/>
-          </a:prstGeom>
-          <a:noFill/>
-        </p:spPr>
-        <p:txBody>
-          <a:bodyPr wrap="square" rtlCol="0">
-            <a:spAutoFit/>
-          </a:bodyPr>
-          <a:lstStyle/>
-          <a:p>
-            <a:pPr algn="ctr"/>
-            <a:r>
               <a:rPr lang="it-IT" dirty="0">
                 <a:solidFill>
                   <a:schemeClr val="bg1"/>
                 </a:solidFill>
               </a:rPr>
-              <a:t>DATA SAVE</a:t>
+              <a:t>W_SUM</a:t>
             </a:r>
             <a:endParaRPr lang="en-US" dirty="0">
               <a:solidFill>
@@ -24870,196 +24796,2461 @@
           </a:p>
         </p:txBody>
       </p:sp>
-      <p:sp>
-        <p:nvSpPr>
-          <p:cNvPr id="26" name="TextBox 25">
+      <p:graphicFrame>
+        <p:nvGraphicFramePr>
+          <p:cNvPr id="20" name="Table 29">
             <a:extLst>
               <a:ext uri="{FF2B5EF4-FFF2-40B4-BE49-F238E27FC236}">
-                <a16:creationId xmlns:a16="http://schemas.microsoft.com/office/drawing/2014/main" id="{7C2F95A6-8922-3034-9415-FFDEED8B819E}"/>
+                <a16:creationId xmlns:a16="http://schemas.microsoft.com/office/drawing/2014/main" id="{D5266D1D-81C6-CC12-4204-C44881614839}"/>
               </a:ext>
             </a:extLst>
           </p:cNvPr>
-          <p:cNvSpPr txBox="1"/>
-          <p:nvPr/>
-        </p:nvSpPr>
-        <p:spPr>
-          <a:xfrm>
-            <a:off x="4864898" y="4614672"/>
-            <a:ext cx="3220883" cy="1200329"/>
-          </a:xfrm>
-          <a:prstGeom prst="rect">
-            <a:avLst/>
-          </a:prstGeom>
-          <a:noFill/>
-        </p:spPr>
-        <p:txBody>
-          <a:bodyPr wrap="square" rtlCol="0">
-            <a:spAutoFit/>
-          </a:bodyPr>
-          <a:lstStyle/>
-          <a:p>
-            <a:pPr algn="ctr"/>
-            <a:r>
-              <a:rPr lang="it-IT" dirty="0"/>
-              <a:t>N_OUTPUT_REC_0</a:t>
-            </a:r>
-          </a:p>
-          <a:p>
-            <a:pPr algn="ctr"/>
-            <a:r>
-              <a:rPr lang="it-IT" dirty="0"/>
-              <a:t>.</a:t>
-            </a:r>
-          </a:p>
-          <a:p>
-            <a:pPr algn="ctr"/>
-            <a:r>
-              <a:rPr lang="it-IT" dirty="0"/>
-              <a:t>.</a:t>
-            </a:r>
-          </a:p>
-          <a:p>
-            <a:pPr algn="ctr"/>
-            <a:r>
-              <a:rPr lang="it-IT" dirty="0"/>
-              <a:t>N_OUTPUT_REC_(P-1)</a:t>
-            </a:r>
-          </a:p>
-        </p:txBody>
-      </p:sp>
-      <p:sp>
-        <p:nvSpPr>
-          <p:cNvPr id="27" name="TextBox 26">
-            <a:extLst>
-              <a:ext uri="{FF2B5EF4-FFF2-40B4-BE49-F238E27FC236}">
-                <a16:creationId xmlns:a16="http://schemas.microsoft.com/office/drawing/2014/main" id="{9ADDAE1B-8907-601D-BD69-C84FA2DA43A3}"/>
-              </a:ext>
-            </a:extLst>
-          </p:cNvPr>
-          <p:cNvSpPr txBox="1"/>
-          <p:nvPr/>
-        </p:nvSpPr>
-        <p:spPr>
-          <a:xfrm>
-            <a:off x="4991095" y="1207777"/>
-            <a:ext cx="2968487" cy="369332"/>
-          </a:xfrm>
-          <a:prstGeom prst="rect">
-            <a:avLst/>
-          </a:prstGeom>
-          <a:noFill/>
-        </p:spPr>
-        <p:txBody>
-          <a:bodyPr wrap="square" rtlCol="0">
-            <a:spAutoFit/>
-          </a:bodyPr>
-          <a:lstStyle/>
-          <a:p>
-            <a:pPr algn="ctr"/>
-            <a:r>
-              <a:rPr lang="it-IT" dirty="0">
-                <a:solidFill>
-                  <a:schemeClr val="bg1"/>
-                </a:solidFill>
-              </a:rPr>
-              <a:t>PREVIOUS LAYER</a:t>
-            </a:r>
-            <a:endParaRPr lang="en-US" dirty="0">
-              <a:solidFill>
-                <a:schemeClr val="bg1"/>
-              </a:solidFill>
-            </a:endParaRPr>
-          </a:p>
-        </p:txBody>
-      </p:sp>
-      <p:sp>
-        <p:nvSpPr>
-          <p:cNvPr id="28" name="TextBox 27">
-            <a:extLst>
-              <a:ext uri="{FF2B5EF4-FFF2-40B4-BE49-F238E27FC236}">
-                <a16:creationId xmlns:a16="http://schemas.microsoft.com/office/drawing/2014/main" id="{F6557F01-1F47-D174-AA49-FB104A383980}"/>
-              </a:ext>
-            </a:extLst>
-          </p:cNvPr>
-          <p:cNvSpPr txBox="1"/>
-          <p:nvPr/>
-        </p:nvSpPr>
-        <p:spPr>
-          <a:xfrm>
-            <a:off x="8926559" y="1698772"/>
-            <a:ext cx="2101360" cy="923330"/>
-          </a:xfrm>
-          <a:prstGeom prst="rect">
-            <a:avLst/>
-          </a:prstGeom>
-          <a:noFill/>
-        </p:spPr>
-        <p:txBody>
-          <a:bodyPr wrap="square" rtlCol="0">
-            <a:spAutoFit/>
-          </a:bodyPr>
-          <a:lstStyle/>
-          <a:p>
-            <a:r>
-              <a:rPr lang="it-IT" dirty="0">
-                <a:solidFill>
-                  <a:schemeClr val="bg1"/>
-                </a:solidFill>
-              </a:rPr>
-              <a:t>WE DO NOT SAVE ANY DATA FROM OTHER LAYERS</a:t>
-            </a:r>
-            <a:endParaRPr lang="en-US" dirty="0">
-              <a:solidFill>
-                <a:schemeClr val="bg1"/>
-              </a:solidFill>
-            </a:endParaRPr>
-          </a:p>
-        </p:txBody>
-      </p:sp>
-      <p:sp>
-        <p:nvSpPr>
-          <p:cNvPr id="29" name="TextBox 28">
-            <a:extLst>
-              <a:ext uri="{FF2B5EF4-FFF2-40B4-BE49-F238E27FC236}">
-                <a16:creationId xmlns:a16="http://schemas.microsoft.com/office/drawing/2014/main" id="{A089816F-E3B0-B04A-6760-F52C2821C239}"/>
-              </a:ext>
-            </a:extLst>
-          </p:cNvPr>
-          <p:cNvSpPr txBox="1"/>
-          <p:nvPr/>
-        </p:nvSpPr>
-        <p:spPr>
-          <a:xfrm>
-            <a:off x="8880319" y="2912649"/>
-            <a:ext cx="1976684" cy="2862322"/>
-          </a:xfrm>
-          <a:prstGeom prst="rect">
-            <a:avLst/>
-          </a:prstGeom>
-          <a:noFill/>
-        </p:spPr>
-        <p:txBody>
-          <a:bodyPr wrap="square" rtlCol="0">
-            <a:spAutoFit/>
-          </a:bodyPr>
-          <a:lstStyle/>
-          <a:p>
-            <a:r>
-              <a:rPr lang="it-IT" dirty="0">
-                <a:solidFill>
-                  <a:schemeClr val="bg1"/>
-                </a:solidFill>
-              </a:rPr>
-              <a:t>THE SAVE AND RECOVERY PROCESS CHANGE DEPENDING ON WEATHER THE LAYER IS THE CURRENTLY ACTIVE ONE OR THE PREVIOUS.</a:t>
-            </a:r>
-            <a:endParaRPr lang="en-US" dirty="0">
-              <a:solidFill>
-                <a:schemeClr val="bg1"/>
-              </a:solidFill>
-            </a:endParaRPr>
-          </a:p>
-        </p:txBody>
-      </p:sp>
+          <p:cNvGraphicFramePr>
+            <a:graphicFrameLocks noGrp="1"/>
+          </p:cNvGraphicFramePr>
+          <p:nvPr>
+            <p:extLst>
+              <p:ext uri="{D42A27DB-BD31-4B8C-83A1-F6EECF244321}">
+                <p14:modId xmlns:p14="http://schemas.microsoft.com/office/powerpoint/2010/main" val="144269905"/>
+              </p:ext>
+            </p:extLst>
+          </p:nvPr>
+        </p:nvGraphicFramePr>
+        <p:xfrm>
+          <a:off x="593165" y="1905297"/>
+          <a:ext cx="3266141" cy="4389120"/>
+        </p:xfrm>
+        <a:graphic>
+          <a:graphicData uri="http://schemas.openxmlformats.org/drawingml/2006/table">
+            <a:tbl>
+              <a:tblPr firstRow="1" bandRow="1">
+                <a:tableStyleId>{5C22544A-7EE6-4342-B048-85BDC9FD1C3A}</a:tableStyleId>
+              </a:tblPr>
+              <a:tblGrid>
+                <a:gridCol w="553094">
+                  <a:extLst>
+                    <a:ext uri="{9D8B030D-6E8A-4147-A177-3AD203B41FA5}">
+                      <a16:colId xmlns:a16="http://schemas.microsoft.com/office/drawing/2014/main" val="1309924922"/>
+                    </a:ext>
+                  </a:extLst>
+                </a:gridCol>
+                <a:gridCol w="2713047">
+                  <a:extLst>
+                    <a:ext uri="{9D8B030D-6E8A-4147-A177-3AD203B41FA5}">
+                      <a16:colId xmlns:a16="http://schemas.microsoft.com/office/drawing/2014/main" val="935044674"/>
+                    </a:ext>
+                  </a:extLst>
+                </a:gridCol>
+              </a:tblGrid>
+              <a:tr h="280653">
+                <a:tc>
+                  <a:txBody>
+                    <a:bodyPr/>
+                    <a:lstStyle/>
+                    <a:p>
+                      <a:r>
+                        <a:rPr lang="it-IT" dirty="0"/>
+                        <a:t>0</a:t>
+                      </a:r>
+                      <a:endParaRPr lang="en-US" dirty="0"/>
+                    </a:p>
+                  </a:txBody>
+                  <a:tcPr/>
+                </a:tc>
+                <a:tc>
+                  <a:txBody>
+                    <a:bodyPr/>
+                    <a:lstStyle/>
+                    <a:p>
+                      <a:pPr algn="ctr"/>
+                      <a:r>
+                        <a:rPr lang="it-IT" dirty="0"/>
+                        <a:t>1</a:t>
+                      </a:r>
+                      <a:endParaRPr lang="en-US" dirty="0"/>
+                    </a:p>
+                  </a:txBody>
+                  <a:tcPr/>
+                </a:tc>
+                <a:extLst>
+                  <a:ext uri="{0D108BD9-81ED-4DB2-BD59-A6C34878D82A}">
+                    <a16:rowId xmlns:a16="http://schemas.microsoft.com/office/drawing/2014/main" val="175597731"/>
+                  </a:ext>
+                </a:extLst>
+              </a:tr>
+              <a:tr h="280653">
+                <a:tc>
+                  <a:txBody>
+                    <a:bodyPr/>
+                    <a:lstStyle/>
+                    <a:p>
+                      <a:r>
+                        <a:rPr lang="it-IT" dirty="0"/>
+                        <a:t>1</a:t>
+                      </a:r>
+                      <a:endParaRPr lang="en-US" dirty="0"/>
+                    </a:p>
+                  </a:txBody>
+                  <a:tcPr/>
+                </a:tc>
+                <a:tc>
+                  <a:txBody>
+                    <a:bodyPr/>
+                    <a:lstStyle/>
+                    <a:p>
+                      <a:pPr algn="ctr"/>
+                      <a:r>
+                        <a:rPr lang="it-IT" dirty="0"/>
+                        <a:t>D.C.</a:t>
+                      </a:r>
+                      <a:endParaRPr lang="en-US" dirty="0"/>
+                    </a:p>
+                  </a:txBody>
+                  <a:tcPr/>
+                </a:tc>
+                <a:extLst>
+                  <a:ext uri="{0D108BD9-81ED-4DB2-BD59-A6C34878D82A}">
+                    <a16:rowId xmlns:a16="http://schemas.microsoft.com/office/drawing/2014/main" val="10764930"/>
+                  </a:ext>
+                </a:extLst>
+              </a:tr>
+              <a:tr h="280653">
+                <a:tc>
+                  <a:txBody>
+                    <a:bodyPr/>
+                    <a:lstStyle/>
+                    <a:p>
+                      <a:r>
+                        <a:rPr lang="it-IT" dirty="0"/>
+                        <a:t>2</a:t>
+                      </a:r>
+                      <a:endParaRPr lang="en-US" dirty="0"/>
+                    </a:p>
+                  </a:txBody>
+                  <a:tcPr/>
+                </a:tc>
+                <a:tc>
+                  <a:txBody>
+                    <a:bodyPr/>
+                    <a:lstStyle/>
+                    <a:p>
+                      <a:pPr algn="ctr"/>
+                      <a:r>
+                        <a:rPr lang="it-IT" dirty="0"/>
+                        <a:t>D.C.</a:t>
+                      </a:r>
+                    </a:p>
+                  </a:txBody>
+                  <a:tcPr/>
+                </a:tc>
+                <a:extLst>
+                  <a:ext uri="{0D108BD9-81ED-4DB2-BD59-A6C34878D82A}">
+                    <a16:rowId xmlns:a16="http://schemas.microsoft.com/office/drawing/2014/main" val="2033447407"/>
+                  </a:ext>
+                </a:extLst>
+              </a:tr>
+              <a:tr h="280653">
+                <a:tc>
+                  <a:txBody>
+                    <a:bodyPr/>
+                    <a:lstStyle/>
+                    <a:p>
+                      <a:endParaRPr lang="en-US"/>
+                    </a:p>
+                  </a:txBody>
+                  <a:tcPr/>
+                </a:tc>
+                <a:tc>
+                  <a:txBody>
+                    <a:bodyPr/>
+                    <a:lstStyle/>
+                    <a:p>
+                      <a:pPr algn="ctr"/>
+                      <a:endParaRPr lang="en-US"/>
+                    </a:p>
+                  </a:txBody>
+                  <a:tcPr/>
+                </a:tc>
+                <a:extLst>
+                  <a:ext uri="{0D108BD9-81ED-4DB2-BD59-A6C34878D82A}">
+                    <a16:rowId xmlns:a16="http://schemas.microsoft.com/office/drawing/2014/main" val="2584797129"/>
+                  </a:ext>
+                </a:extLst>
+              </a:tr>
+              <a:tr h="280653">
+                <a:tc>
+                  <a:txBody>
+                    <a:bodyPr/>
+                    <a:lstStyle/>
+                    <a:p>
+                      <a:endParaRPr lang="en-US"/>
+                    </a:p>
+                  </a:txBody>
+                  <a:tcPr/>
+                </a:tc>
+                <a:tc>
+                  <a:txBody>
+                    <a:bodyPr/>
+                    <a:lstStyle/>
+                    <a:p>
+                      <a:pPr algn="ctr"/>
+                      <a:endParaRPr lang="en-US" dirty="0"/>
+                    </a:p>
+                  </a:txBody>
+                  <a:tcPr/>
+                </a:tc>
+                <a:extLst>
+                  <a:ext uri="{0D108BD9-81ED-4DB2-BD59-A6C34878D82A}">
+                    <a16:rowId xmlns:a16="http://schemas.microsoft.com/office/drawing/2014/main" val="2782114930"/>
+                  </a:ext>
+                </a:extLst>
+              </a:tr>
+              <a:tr h="280653">
+                <a:tc>
+                  <a:txBody>
+                    <a:bodyPr/>
+                    <a:lstStyle/>
+                    <a:p>
+                      <a:endParaRPr lang="en-US"/>
+                    </a:p>
+                  </a:txBody>
+                  <a:tcPr/>
+                </a:tc>
+                <a:tc>
+                  <a:txBody>
+                    <a:bodyPr/>
+                    <a:lstStyle/>
+                    <a:p>
+                      <a:pPr algn="ctr"/>
+                      <a:endParaRPr lang="en-US" dirty="0"/>
+                    </a:p>
+                  </a:txBody>
+                  <a:tcPr/>
+                </a:tc>
+                <a:extLst>
+                  <a:ext uri="{0D108BD9-81ED-4DB2-BD59-A6C34878D82A}">
+                    <a16:rowId xmlns:a16="http://schemas.microsoft.com/office/drawing/2014/main" val="2458746661"/>
+                  </a:ext>
+                </a:extLst>
+              </a:tr>
+              <a:tr h="280653">
+                <a:tc>
+                  <a:txBody>
+                    <a:bodyPr/>
+                    <a:lstStyle/>
+                    <a:p>
+                      <a:endParaRPr lang="en-US"/>
+                    </a:p>
+                  </a:txBody>
+                  <a:tcPr/>
+                </a:tc>
+                <a:tc>
+                  <a:txBody>
+                    <a:bodyPr/>
+                    <a:lstStyle/>
+                    <a:p>
+                      <a:pPr algn="ctr"/>
+                      <a:endParaRPr lang="en-US" dirty="0"/>
+                    </a:p>
+                  </a:txBody>
+                  <a:tcPr/>
+                </a:tc>
+                <a:extLst>
+                  <a:ext uri="{0D108BD9-81ED-4DB2-BD59-A6C34878D82A}">
+                    <a16:rowId xmlns:a16="http://schemas.microsoft.com/office/drawing/2014/main" val="1827213602"/>
+                  </a:ext>
+                </a:extLst>
+              </a:tr>
+              <a:tr h="280653">
+                <a:tc>
+                  <a:txBody>
+                    <a:bodyPr/>
+                    <a:lstStyle/>
+                    <a:p>
+                      <a:endParaRPr lang="en-US"/>
+                    </a:p>
+                  </a:txBody>
+                  <a:tcPr/>
+                </a:tc>
+                <a:tc>
+                  <a:txBody>
+                    <a:bodyPr/>
+                    <a:lstStyle/>
+                    <a:p>
+                      <a:pPr algn="ctr"/>
+                      <a:endParaRPr lang="en-US" dirty="0"/>
+                    </a:p>
+                  </a:txBody>
+                  <a:tcPr/>
+                </a:tc>
+                <a:extLst>
+                  <a:ext uri="{0D108BD9-81ED-4DB2-BD59-A6C34878D82A}">
+                    <a16:rowId xmlns:a16="http://schemas.microsoft.com/office/drawing/2014/main" val="2623816108"/>
+                  </a:ext>
+                </a:extLst>
+              </a:tr>
+              <a:tr h="280653">
+                <a:tc>
+                  <a:txBody>
+                    <a:bodyPr/>
+                    <a:lstStyle/>
+                    <a:p>
+                      <a:endParaRPr lang="en-US"/>
+                    </a:p>
+                  </a:txBody>
+                  <a:tcPr/>
+                </a:tc>
+                <a:tc>
+                  <a:txBody>
+                    <a:bodyPr/>
+                    <a:lstStyle/>
+                    <a:p>
+                      <a:pPr algn="ctr"/>
+                      <a:endParaRPr lang="en-US" dirty="0"/>
+                    </a:p>
+                  </a:txBody>
+                  <a:tcPr/>
+                </a:tc>
+                <a:extLst>
+                  <a:ext uri="{0D108BD9-81ED-4DB2-BD59-A6C34878D82A}">
+                    <a16:rowId xmlns:a16="http://schemas.microsoft.com/office/drawing/2014/main" val="2396385500"/>
+                  </a:ext>
+                </a:extLst>
+              </a:tr>
+              <a:tr h="280653">
+                <a:tc>
+                  <a:txBody>
+                    <a:bodyPr/>
+                    <a:lstStyle/>
+                    <a:p>
+                      <a:endParaRPr lang="en-US"/>
+                    </a:p>
+                  </a:txBody>
+                  <a:tcPr/>
+                </a:tc>
+                <a:tc>
+                  <a:txBody>
+                    <a:bodyPr/>
+                    <a:lstStyle/>
+                    <a:p>
+                      <a:pPr algn="ctr"/>
+                      <a:endParaRPr lang="en-US" dirty="0"/>
+                    </a:p>
+                  </a:txBody>
+                  <a:tcPr/>
+                </a:tc>
+                <a:extLst>
+                  <a:ext uri="{0D108BD9-81ED-4DB2-BD59-A6C34878D82A}">
+                    <a16:rowId xmlns:a16="http://schemas.microsoft.com/office/drawing/2014/main" val="1383135423"/>
+                  </a:ext>
+                </a:extLst>
+              </a:tr>
+              <a:tr h="280653">
+                <a:tc>
+                  <a:txBody>
+                    <a:bodyPr/>
+                    <a:lstStyle/>
+                    <a:p>
+                      <a:endParaRPr lang="en-US"/>
+                    </a:p>
+                  </a:txBody>
+                  <a:tcPr/>
+                </a:tc>
+                <a:tc>
+                  <a:txBody>
+                    <a:bodyPr/>
+                    <a:lstStyle/>
+                    <a:p>
+                      <a:pPr algn="ctr"/>
+                      <a:endParaRPr lang="en-US" dirty="0"/>
+                    </a:p>
+                  </a:txBody>
+                  <a:tcPr/>
+                </a:tc>
+                <a:extLst>
+                  <a:ext uri="{0D108BD9-81ED-4DB2-BD59-A6C34878D82A}">
+                    <a16:rowId xmlns:a16="http://schemas.microsoft.com/office/drawing/2014/main" val="3776137944"/>
+                  </a:ext>
+                </a:extLst>
+              </a:tr>
+              <a:tr h="280653">
+                <a:tc>
+                  <a:txBody>
+                    <a:bodyPr/>
+                    <a:lstStyle/>
+                    <a:p>
+                      <a:r>
+                        <a:rPr lang="it-IT" dirty="0"/>
+                        <a:t>32</a:t>
+                      </a:r>
+                      <a:endParaRPr lang="en-US" dirty="0"/>
+                    </a:p>
+                  </a:txBody>
+                  <a:tcPr/>
+                </a:tc>
+                <a:tc>
+                  <a:txBody>
+                    <a:bodyPr/>
+                    <a:lstStyle/>
+                    <a:p>
+                      <a:pPr algn="ctr"/>
+                      <a:r>
+                        <a:rPr lang="it-IT" dirty="0"/>
+                        <a:t>D.C.</a:t>
+                      </a:r>
+                      <a:endParaRPr lang="en-US" dirty="0"/>
+                    </a:p>
+                  </a:txBody>
+                  <a:tcPr/>
+                </a:tc>
+                <a:extLst>
+                  <a:ext uri="{0D108BD9-81ED-4DB2-BD59-A6C34878D82A}">
+                    <a16:rowId xmlns:a16="http://schemas.microsoft.com/office/drawing/2014/main" val="602303420"/>
+                  </a:ext>
+                </a:extLst>
+              </a:tr>
+            </a:tbl>
+          </a:graphicData>
+        </a:graphic>
+      </p:graphicFrame>
+      <mc:AlternateContent xmlns:mc="http://schemas.openxmlformats.org/markup-compatibility/2006">
+        <mc:Choice xmlns:a14="http://schemas.microsoft.com/office/drawing/2010/main" Requires="a14">
+          <p:graphicFrame>
+            <p:nvGraphicFramePr>
+              <p:cNvPr id="30" name="Table 29">
+                <a:extLst>
+                  <a:ext uri="{FF2B5EF4-FFF2-40B4-BE49-F238E27FC236}">
+                    <a16:creationId xmlns:a16="http://schemas.microsoft.com/office/drawing/2014/main" id="{C1B66379-838C-697E-901B-C7A7B7AE9C7B}"/>
+                  </a:ext>
+                </a:extLst>
+              </p:cNvPr>
+              <p:cNvGraphicFramePr>
+                <a:graphicFrameLocks noGrp="1"/>
+              </p:cNvGraphicFramePr>
+              <p:nvPr>
+                <p:extLst>
+                  <p:ext uri="{D42A27DB-BD31-4B8C-83A1-F6EECF244321}">
+                    <p14:modId xmlns:p14="http://schemas.microsoft.com/office/powerpoint/2010/main" val="793009340"/>
+                  </p:ext>
+                </p:extLst>
+              </p:nvPr>
+            </p:nvGraphicFramePr>
+            <p:xfrm>
+              <a:off x="4131280" y="1905297"/>
+              <a:ext cx="3266141" cy="4389120"/>
+            </p:xfrm>
+            <a:graphic>
+              <a:graphicData uri="http://schemas.openxmlformats.org/drawingml/2006/table">
+                <a:tbl>
+                  <a:tblPr firstRow="1" bandRow="1">
+                    <a:tableStyleId>{5C22544A-7EE6-4342-B048-85BDC9FD1C3A}</a:tableStyleId>
+                  </a:tblPr>
+                  <a:tblGrid>
+                    <a:gridCol w="553094">
+                      <a:extLst>
+                        <a:ext uri="{9D8B030D-6E8A-4147-A177-3AD203B41FA5}">
+                          <a16:colId xmlns:a16="http://schemas.microsoft.com/office/drawing/2014/main" val="1309924922"/>
+                        </a:ext>
+                      </a:extLst>
+                    </a:gridCol>
+                    <a:gridCol w="2713047">
+                      <a:extLst>
+                        <a:ext uri="{9D8B030D-6E8A-4147-A177-3AD203B41FA5}">
+                          <a16:colId xmlns:a16="http://schemas.microsoft.com/office/drawing/2014/main" val="935044674"/>
+                        </a:ext>
+                      </a:extLst>
+                    </a:gridCol>
+                  </a:tblGrid>
+                  <a:tr h="280653">
+                    <a:tc>
+                      <a:txBody>
+                        <a:bodyPr/>
+                        <a:lstStyle/>
+                        <a:p>
+                          <a:r>
+                            <a:rPr lang="it-IT" dirty="0"/>
+                            <a:t>0</a:t>
+                          </a:r>
+                          <a:endParaRPr lang="en-US" dirty="0"/>
+                        </a:p>
+                      </a:txBody>
+                      <a:tcPr/>
+                    </a:tc>
+                    <a:tc>
+                      <a:txBody>
+                        <a:bodyPr/>
+                        <a:lstStyle/>
+                        <a:p>
+                          <a:pPr algn="ctr"/>
+                          <a:r>
+                            <a:rPr lang="it-IT" dirty="0"/>
+                            <a:t>2</a:t>
+                          </a:r>
+                          <a:endParaRPr lang="en-US" dirty="0"/>
+                        </a:p>
+                      </a:txBody>
+                      <a:tcPr/>
+                    </a:tc>
+                    <a:extLst>
+                      <a:ext uri="{0D108BD9-81ED-4DB2-BD59-A6C34878D82A}">
+                        <a16:rowId xmlns:a16="http://schemas.microsoft.com/office/drawing/2014/main" val="175597731"/>
+                      </a:ext>
+                    </a:extLst>
+                  </a:tr>
+                  <a:tr h="280653">
+                    <a:tc>
+                      <a:txBody>
+                        <a:bodyPr/>
+                        <a:lstStyle/>
+                        <a:p>
+                          <a:r>
+                            <a:rPr lang="it-IT" dirty="0"/>
+                            <a:t>1</a:t>
+                          </a:r>
+                          <a:endParaRPr lang="en-US" dirty="0"/>
+                        </a:p>
+                      </a:txBody>
+                      <a:tcPr/>
+                    </a:tc>
+                    <a:tc>
+                      <a:txBody>
+                        <a:bodyPr/>
+                        <a:lstStyle/>
+                        <a:p>
+                          <a:pPr algn="ctr"/>
+                          <a14:m>
+                            <m:oMathPara xmlns:m="http://schemas.openxmlformats.org/officeDocument/2006/math">
+                              <m:oMathParaPr>
+                                <m:jc m:val="centerGroup"/>
+                              </m:oMathParaPr>
+                              <m:oMath xmlns:m="http://schemas.openxmlformats.org/officeDocument/2006/math">
+                                <m:r>
+                                  <a:rPr lang="it-IT" b="0" i="1" smtClean="0">
+                                    <a:latin typeface="Cambria Math" panose="02040503050406030204" pitchFamily="18" charset="0"/>
+                                  </a:rPr>
+                                  <m:t>𝑦</m:t>
+                                </m:r>
+                                <m:r>
+                                  <a:rPr lang="it-IT" b="0" i="1" smtClean="0">
+                                    <a:latin typeface="Cambria Math" panose="02040503050406030204" pitchFamily="18" charset="0"/>
+                                  </a:rPr>
+                                  <m:t>(1)</m:t>
+                                </m:r>
+                              </m:oMath>
+                            </m:oMathPara>
+                          </a14:m>
+                          <a:endParaRPr lang="en-US" dirty="0"/>
+                        </a:p>
+                      </a:txBody>
+                      <a:tcPr/>
+                    </a:tc>
+                    <a:extLst>
+                      <a:ext uri="{0D108BD9-81ED-4DB2-BD59-A6C34878D82A}">
+                        <a16:rowId xmlns:a16="http://schemas.microsoft.com/office/drawing/2014/main" val="10764930"/>
+                      </a:ext>
+                    </a:extLst>
+                  </a:tr>
+                  <a:tr h="280653">
+                    <a:tc>
+                      <a:txBody>
+                        <a:bodyPr/>
+                        <a:lstStyle/>
+                        <a:p>
+                          <a:r>
+                            <a:rPr lang="it-IT" dirty="0"/>
+                            <a:t>2</a:t>
+                          </a:r>
+                          <a:endParaRPr lang="en-US" dirty="0"/>
+                        </a:p>
+                      </a:txBody>
+                      <a:tcPr/>
+                    </a:tc>
+                    <a:tc>
+                      <a:txBody>
+                        <a:bodyPr/>
+                        <a:lstStyle/>
+                        <a:p>
+                          <a:pPr marL="0" marR="0" lvl="0" indent="0" algn="ctr" defTabSz="457200" rtl="0" eaLnBrk="1" fontAlgn="auto" latinLnBrk="0" hangingPunct="1">
+                            <a:lnSpc>
+                              <a:spcPct val="100000"/>
+                            </a:lnSpc>
+                            <a:spcBef>
+                              <a:spcPts val="0"/>
+                            </a:spcBef>
+                            <a:spcAft>
+                              <a:spcPts val="0"/>
+                            </a:spcAft>
+                            <a:buClrTx/>
+                            <a:buSzTx/>
+                            <a:buFontTx/>
+                            <a:buNone/>
+                            <a:tabLst/>
+                            <a:defRPr/>
+                          </a:pPr>
+                          <a14:m>
+                            <m:oMathPara xmlns:m="http://schemas.openxmlformats.org/officeDocument/2006/math">
+                              <m:oMathParaPr>
+                                <m:jc m:val="centerGroup"/>
+                              </m:oMathParaPr>
+                              <m:oMath xmlns:m="http://schemas.openxmlformats.org/officeDocument/2006/math">
+                                <m:r>
+                                  <a:rPr lang="it-IT" b="0" i="1" smtClean="0">
+                                    <a:latin typeface="Cambria Math" panose="02040503050406030204" pitchFamily="18" charset="0"/>
+                                  </a:rPr>
+                                  <m:t>𝑦</m:t>
+                                </m:r>
+                                <m:r>
+                                  <a:rPr lang="it-IT" b="0" i="1" smtClean="0">
+                                    <a:latin typeface="Cambria Math" panose="02040503050406030204" pitchFamily="18" charset="0"/>
+                                  </a:rPr>
+                                  <m:t>(2)</m:t>
+                                </m:r>
+                              </m:oMath>
+                            </m:oMathPara>
+                          </a14:m>
+                          <a:endParaRPr lang="en-US" dirty="0"/>
+                        </a:p>
+                      </a:txBody>
+                      <a:tcPr/>
+                    </a:tc>
+                    <a:extLst>
+                      <a:ext uri="{0D108BD9-81ED-4DB2-BD59-A6C34878D82A}">
+                        <a16:rowId xmlns:a16="http://schemas.microsoft.com/office/drawing/2014/main" val="2033447407"/>
+                      </a:ext>
+                    </a:extLst>
+                  </a:tr>
+                  <a:tr h="280653">
+                    <a:tc>
+                      <a:txBody>
+                        <a:bodyPr/>
+                        <a:lstStyle/>
+                        <a:p>
+                          <a:endParaRPr lang="en-US"/>
+                        </a:p>
+                      </a:txBody>
+                      <a:tcPr/>
+                    </a:tc>
+                    <a:tc>
+                      <a:txBody>
+                        <a:bodyPr/>
+                        <a:lstStyle/>
+                        <a:p>
+                          <a:pPr algn="ctr"/>
+                          <a:endParaRPr lang="en-US"/>
+                        </a:p>
+                      </a:txBody>
+                      <a:tcPr/>
+                    </a:tc>
+                    <a:extLst>
+                      <a:ext uri="{0D108BD9-81ED-4DB2-BD59-A6C34878D82A}">
+                        <a16:rowId xmlns:a16="http://schemas.microsoft.com/office/drawing/2014/main" val="2584797129"/>
+                      </a:ext>
+                    </a:extLst>
+                  </a:tr>
+                  <a:tr h="280653">
+                    <a:tc>
+                      <a:txBody>
+                        <a:bodyPr/>
+                        <a:lstStyle/>
+                        <a:p>
+                          <a:endParaRPr lang="en-US"/>
+                        </a:p>
+                      </a:txBody>
+                      <a:tcPr/>
+                    </a:tc>
+                    <a:tc>
+                      <a:txBody>
+                        <a:bodyPr/>
+                        <a:lstStyle/>
+                        <a:p>
+                          <a:pPr algn="ctr"/>
+                          <a:endParaRPr lang="en-US" dirty="0"/>
+                        </a:p>
+                      </a:txBody>
+                      <a:tcPr/>
+                    </a:tc>
+                    <a:extLst>
+                      <a:ext uri="{0D108BD9-81ED-4DB2-BD59-A6C34878D82A}">
+                        <a16:rowId xmlns:a16="http://schemas.microsoft.com/office/drawing/2014/main" val="2782114930"/>
+                      </a:ext>
+                    </a:extLst>
+                  </a:tr>
+                  <a:tr h="280653">
+                    <a:tc>
+                      <a:txBody>
+                        <a:bodyPr/>
+                        <a:lstStyle/>
+                        <a:p>
+                          <a:endParaRPr lang="en-US"/>
+                        </a:p>
+                      </a:txBody>
+                      <a:tcPr/>
+                    </a:tc>
+                    <a:tc>
+                      <a:txBody>
+                        <a:bodyPr/>
+                        <a:lstStyle/>
+                        <a:p>
+                          <a:pPr algn="ctr"/>
+                          <a:endParaRPr lang="en-US" dirty="0"/>
+                        </a:p>
+                      </a:txBody>
+                      <a:tcPr/>
+                    </a:tc>
+                    <a:extLst>
+                      <a:ext uri="{0D108BD9-81ED-4DB2-BD59-A6C34878D82A}">
+                        <a16:rowId xmlns:a16="http://schemas.microsoft.com/office/drawing/2014/main" val="2458746661"/>
+                      </a:ext>
+                    </a:extLst>
+                  </a:tr>
+                  <a:tr h="280653">
+                    <a:tc>
+                      <a:txBody>
+                        <a:bodyPr/>
+                        <a:lstStyle/>
+                        <a:p>
+                          <a:endParaRPr lang="en-US"/>
+                        </a:p>
+                      </a:txBody>
+                      <a:tcPr/>
+                    </a:tc>
+                    <a:tc>
+                      <a:txBody>
+                        <a:bodyPr/>
+                        <a:lstStyle/>
+                        <a:p>
+                          <a:pPr algn="ctr"/>
+                          <a:endParaRPr lang="en-US"/>
+                        </a:p>
+                      </a:txBody>
+                      <a:tcPr/>
+                    </a:tc>
+                    <a:extLst>
+                      <a:ext uri="{0D108BD9-81ED-4DB2-BD59-A6C34878D82A}">
+                        <a16:rowId xmlns:a16="http://schemas.microsoft.com/office/drawing/2014/main" val="1827213602"/>
+                      </a:ext>
+                    </a:extLst>
+                  </a:tr>
+                  <a:tr h="280653">
+                    <a:tc>
+                      <a:txBody>
+                        <a:bodyPr/>
+                        <a:lstStyle/>
+                        <a:p>
+                          <a:endParaRPr lang="en-US"/>
+                        </a:p>
+                      </a:txBody>
+                      <a:tcPr/>
+                    </a:tc>
+                    <a:tc>
+                      <a:txBody>
+                        <a:bodyPr/>
+                        <a:lstStyle/>
+                        <a:p>
+                          <a:pPr algn="ctr"/>
+                          <a:endParaRPr lang="en-US" dirty="0"/>
+                        </a:p>
+                      </a:txBody>
+                      <a:tcPr/>
+                    </a:tc>
+                    <a:extLst>
+                      <a:ext uri="{0D108BD9-81ED-4DB2-BD59-A6C34878D82A}">
+                        <a16:rowId xmlns:a16="http://schemas.microsoft.com/office/drawing/2014/main" val="2623816108"/>
+                      </a:ext>
+                    </a:extLst>
+                  </a:tr>
+                  <a:tr h="280653">
+                    <a:tc>
+                      <a:txBody>
+                        <a:bodyPr/>
+                        <a:lstStyle/>
+                        <a:p>
+                          <a:endParaRPr lang="en-US"/>
+                        </a:p>
+                      </a:txBody>
+                      <a:tcPr/>
+                    </a:tc>
+                    <a:tc>
+                      <a:txBody>
+                        <a:bodyPr/>
+                        <a:lstStyle/>
+                        <a:p>
+                          <a:pPr algn="ctr"/>
+                          <a:endParaRPr lang="en-US" dirty="0"/>
+                        </a:p>
+                      </a:txBody>
+                      <a:tcPr/>
+                    </a:tc>
+                    <a:extLst>
+                      <a:ext uri="{0D108BD9-81ED-4DB2-BD59-A6C34878D82A}">
+                        <a16:rowId xmlns:a16="http://schemas.microsoft.com/office/drawing/2014/main" val="2396385500"/>
+                      </a:ext>
+                    </a:extLst>
+                  </a:tr>
+                  <a:tr h="280653">
+                    <a:tc>
+                      <a:txBody>
+                        <a:bodyPr/>
+                        <a:lstStyle/>
+                        <a:p>
+                          <a:r>
+                            <a:rPr lang="it-IT" dirty="0"/>
+                            <a:t>30</a:t>
+                          </a:r>
+                          <a:endParaRPr lang="en-US" dirty="0"/>
+                        </a:p>
+                      </a:txBody>
+                      <a:tcPr/>
+                    </a:tc>
+                    <a:tc>
+                      <a:txBody>
+                        <a:bodyPr/>
+                        <a:lstStyle/>
+                        <a:p>
+                          <a:pPr marL="0" marR="0" lvl="0" indent="0" algn="ctr" defTabSz="457200" rtl="0" eaLnBrk="1" fontAlgn="auto" latinLnBrk="0" hangingPunct="1">
+                            <a:lnSpc>
+                              <a:spcPct val="100000"/>
+                            </a:lnSpc>
+                            <a:spcBef>
+                              <a:spcPts val="0"/>
+                            </a:spcBef>
+                            <a:spcAft>
+                              <a:spcPts val="0"/>
+                            </a:spcAft>
+                            <a:buClrTx/>
+                            <a:buSzTx/>
+                            <a:buFontTx/>
+                            <a:buNone/>
+                            <a:tabLst/>
+                            <a:defRPr/>
+                          </a:pPr>
+                          <a14:m>
+                            <m:oMathPara xmlns:m="http://schemas.openxmlformats.org/officeDocument/2006/math">
+                              <m:oMathParaPr>
+                                <m:jc m:val="centerGroup"/>
+                              </m:oMathParaPr>
+                              <m:oMath xmlns:m="http://schemas.openxmlformats.org/officeDocument/2006/math">
+                                <m:r>
+                                  <a:rPr lang="it-IT" b="0" i="1" smtClean="0">
+                                    <a:latin typeface="Cambria Math" panose="02040503050406030204" pitchFamily="18" charset="0"/>
+                                  </a:rPr>
+                                  <m:t>𝑦</m:t>
+                                </m:r>
+                                <m:r>
+                                  <a:rPr lang="it-IT" b="0" i="1" smtClean="0">
+                                    <a:latin typeface="Cambria Math" panose="02040503050406030204" pitchFamily="18" charset="0"/>
+                                  </a:rPr>
+                                  <m:t>(30)</m:t>
+                                </m:r>
+                              </m:oMath>
+                            </m:oMathPara>
+                          </a14:m>
+                          <a:endParaRPr lang="en-US" dirty="0"/>
+                        </a:p>
+                      </a:txBody>
+                      <a:tcPr/>
+                    </a:tc>
+                    <a:extLst>
+                      <a:ext uri="{0D108BD9-81ED-4DB2-BD59-A6C34878D82A}">
+                        <a16:rowId xmlns:a16="http://schemas.microsoft.com/office/drawing/2014/main" val="1383135423"/>
+                      </a:ext>
+                    </a:extLst>
+                  </a:tr>
+                  <a:tr h="280653">
+                    <a:tc>
+                      <a:txBody>
+                        <a:bodyPr/>
+                        <a:lstStyle/>
+                        <a:p>
+                          <a:r>
+                            <a:rPr lang="it-IT" dirty="0"/>
+                            <a:t>31</a:t>
+                          </a:r>
+                          <a:endParaRPr lang="en-US" dirty="0"/>
+                        </a:p>
+                      </a:txBody>
+                      <a:tcPr/>
+                    </a:tc>
+                    <a:tc>
+                      <a:txBody>
+                        <a:bodyPr/>
+                        <a:lstStyle/>
+                        <a:p>
+                          <a:pPr algn="ctr"/>
+                          <a:r>
+                            <a:rPr lang="it-IT" dirty="0"/>
+                            <a:t>D.C.</a:t>
+                          </a:r>
+                          <a:endParaRPr lang="en-US" dirty="0"/>
+                        </a:p>
+                      </a:txBody>
+                      <a:tcPr/>
+                    </a:tc>
+                    <a:extLst>
+                      <a:ext uri="{0D108BD9-81ED-4DB2-BD59-A6C34878D82A}">
+                        <a16:rowId xmlns:a16="http://schemas.microsoft.com/office/drawing/2014/main" val="3776137944"/>
+                      </a:ext>
+                    </a:extLst>
+                  </a:tr>
+                  <a:tr h="280653">
+                    <a:tc>
+                      <a:txBody>
+                        <a:bodyPr/>
+                        <a:lstStyle/>
+                        <a:p>
+                          <a:r>
+                            <a:rPr lang="it-IT" dirty="0"/>
+                            <a:t>32</a:t>
+                          </a:r>
+                          <a:endParaRPr lang="en-US" dirty="0"/>
+                        </a:p>
+                      </a:txBody>
+                      <a:tcPr/>
+                    </a:tc>
+                    <a:tc>
+                      <a:txBody>
+                        <a:bodyPr/>
+                        <a:lstStyle/>
+                        <a:p>
+                          <a:pPr algn="ctr"/>
+                          <a:r>
+                            <a:rPr lang="it-IT" dirty="0"/>
+                            <a:t>D.C.</a:t>
+                          </a:r>
+                          <a:endParaRPr lang="en-US" dirty="0"/>
+                        </a:p>
+                      </a:txBody>
+                      <a:tcPr/>
+                    </a:tc>
+                    <a:extLst>
+                      <a:ext uri="{0D108BD9-81ED-4DB2-BD59-A6C34878D82A}">
+                        <a16:rowId xmlns:a16="http://schemas.microsoft.com/office/drawing/2014/main" val="602303420"/>
+                      </a:ext>
+                    </a:extLst>
+                  </a:tr>
+                </a:tbl>
+              </a:graphicData>
+            </a:graphic>
+          </p:graphicFrame>
+        </mc:Choice>
+        <mc:Fallback>
+          <p:graphicFrame>
+            <p:nvGraphicFramePr>
+              <p:cNvPr id="30" name="Table 29">
+                <a:extLst>
+                  <a:ext uri="{FF2B5EF4-FFF2-40B4-BE49-F238E27FC236}">
+                    <a16:creationId xmlns:a16="http://schemas.microsoft.com/office/drawing/2014/main" id="{C1B66379-838C-697E-901B-C7A7B7AE9C7B}"/>
+                  </a:ext>
+                </a:extLst>
+              </p:cNvPr>
+              <p:cNvGraphicFramePr>
+                <a:graphicFrameLocks noGrp="1"/>
+              </p:cNvGraphicFramePr>
+              <p:nvPr>
+                <p:extLst>
+                  <p:ext uri="{D42A27DB-BD31-4B8C-83A1-F6EECF244321}">
+                    <p14:modId xmlns:p14="http://schemas.microsoft.com/office/powerpoint/2010/main" val="793009340"/>
+                  </p:ext>
+                </p:extLst>
+              </p:nvPr>
+            </p:nvGraphicFramePr>
+            <p:xfrm>
+              <a:off x="4131280" y="1905297"/>
+              <a:ext cx="3266141" cy="4389120"/>
+            </p:xfrm>
+            <a:graphic>
+              <a:graphicData uri="http://schemas.openxmlformats.org/drawingml/2006/table">
+                <a:tbl>
+                  <a:tblPr firstRow="1" bandRow="1">
+                    <a:tableStyleId>{5C22544A-7EE6-4342-B048-85BDC9FD1C3A}</a:tableStyleId>
+                  </a:tblPr>
+                  <a:tblGrid>
+                    <a:gridCol w="553094">
+                      <a:extLst>
+                        <a:ext uri="{9D8B030D-6E8A-4147-A177-3AD203B41FA5}">
+                          <a16:colId xmlns:a16="http://schemas.microsoft.com/office/drawing/2014/main" val="1309924922"/>
+                        </a:ext>
+                      </a:extLst>
+                    </a:gridCol>
+                    <a:gridCol w="2713047">
+                      <a:extLst>
+                        <a:ext uri="{9D8B030D-6E8A-4147-A177-3AD203B41FA5}">
+                          <a16:colId xmlns:a16="http://schemas.microsoft.com/office/drawing/2014/main" val="935044674"/>
+                        </a:ext>
+                      </a:extLst>
+                    </a:gridCol>
+                  </a:tblGrid>
+                  <a:tr h="365760">
+                    <a:tc>
+                      <a:txBody>
+                        <a:bodyPr/>
+                        <a:lstStyle/>
+                        <a:p>
+                          <a:r>
+                            <a:rPr lang="it-IT" dirty="0"/>
+                            <a:t>0</a:t>
+                          </a:r>
+                          <a:endParaRPr lang="en-US" dirty="0"/>
+                        </a:p>
+                      </a:txBody>
+                      <a:tcPr/>
+                    </a:tc>
+                    <a:tc>
+                      <a:txBody>
+                        <a:bodyPr/>
+                        <a:lstStyle/>
+                        <a:p>
+                          <a:pPr algn="ctr"/>
+                          <a:r>
+                            <a:rPr lang="it-IT" dirty="0"/>
+                            <a:t>2</a:t>
+                          </a:r>
+                          <a:endParaRPr lang="en-US" dirty="0"/>
+                        </a:p>
+                      </a:txBody>
+                      <a:tcPr/>
+                    </a:tc>
+                    <a:extLst>
+                      <a:ext uri="{0D108BD9-81ED-4DB2-BD59-A6C34878D82A}">
+                        <a16:rowId xmlns:a16="http://schemas.microsoft.com/office/drawing/2014/main" val="175597731"/>
+                      </a:ext>
+                    </a:extLst>
+                  </a:tr>
+                  <a:tr h="365760">
+                    <a:tc>
+                      <a:txBody>
+                        <a:bodyPr/>
+                        <a:lstStyle/>
+                        <a:p>
+                          <a:r>
+                            <a:rPr lang="it-IT" dirty="0"/>
+                            <a:t>1</a:t>
+                          </a:r>
+                          <a:endParaRPr lang="en-US" dirty="0"/>
+                        </a:p>
+                      </a:txBody>
+                      <a:tcPr/>
+                    </a:tc>
+                    <a:tc>
+                      <a:txBody>
+                        <a:bodyPr/>
+                        <a:lstStyle/>
+                        <a:p>
+                          <a:endParaRPr lang="en-US"/>
+                        </a:p>
+                      </a:txBody>
+                      <a:tcPr>
+                        <a:blipFill>
+                          <a:blip r:embed="rId3"/>
+                          <a:stretch>
+                            <a:fillRect l="-20628" t="-106667" r="-897" b="-1028333"/>
+                          </a:stretch>
+                        </a:blipFill>
+                      </a:tcPr>
+                    </a:tc>
+                    <a:extLst>
+                      <a:ext uri="{0D108BD9-81ED-4DB2-BD59-A6C34878D82A}">
+                        <a16:rowId xmlns:a16="http://schemas.microsoft.com/office/drawing/2014/main" val="10764930"/>
+                      </a:ext>
+                    </a:extLst>
+                  </a:tr>
+                  <a:tr h="365760">
+                    <a:tc>
+                      <a:txBody>
+                        <a:bodyPr/>
+                        <a:lstStyle/>
+                        <a:p>
+                          <a:r>
+                            <a:rPr lang="it-IT" dirty="0"/>
+                            <a:t>2</a:t>
+                          </a:r>
+                          <a:endParaRPr lang="en-US" dirty="0"/>
+                        </a:p>
+                      </a:txBody>
+                      <a:tcPr/>
+                    </a:tc>
+                    <a:tc>
+                      <a:txBody>
+                        <a:bodyPr/>
+                        <a:lstStyle/>
+                        <a:p>
+                          <a:endParaRPr lang="en-US"/>
+                        </a:p>
+                      </a:txBody>
+                      <a:tcPr>
+                        <a:blipFill>
+                          <a:blip r:embed="rId3"/>
+                          <a:stretch>
+                            <a:fillRect l="-20628" t="-206667" r="-897" b="-928333"/>
+                          </a:stretch>
+                        </a:blipFill>
+                      </a:tcPr>
+                    </a:tc>
+                    <a:extLst>
+                      <a:ext uri="{0D108BD9-81ED-4DB2-BD59-A6C34878D82A}">
+                        <a16:rowId xmlns:a16="http://schemas.microsoft.com/office/drawing/2014/main" val="2033447407"/>
+                      </a:ext>
+                    </a:extLst>
+                  </a:tr>
+                  <a:tr h="365760">
+                    <a:tc>
+                      <a:txBody>
+                        <a:bodyPr/>
+                        <a:lstStyle/>
+                        <a:p>
+                          <a:endParaRPr lang="en-US"/>
+                        </a:p>
+                      </a:txBody>
+                      <a:tcPr/>
+                    </a:tc>
+                    <a:tc>
+                      <a:txBody>
+                        <a:bodyPr/>
+                        <a:lstStyle/>
+                        <a:p>
+                          <a:pPr algn="ctr"/>
+                          <a:endParaRPr lang="en-US"/>
+                        </a:p>
+                      </a:txBody>
+                      <a:tcPr/>
+                    </a:tc>
+                    <a:extLst>
+                      <a:ext uri="{0D108BD9-81ED-4DB2-BD59-A6C34878D82A}">
+                        <a16:rowId xmlns:a16="http://schemas.microsoft.com/office/drawing/2014/main" val="2584797129"/>
+                      </a:ext>
+                    </a:extLst>
+                  </a:tr>
+                  <a:tr h="365760">
+                    <a:tc>
+                      <a:txBody>
+                        <a:bodyPr/>
+                        <a:lstStyle/>
+                        <a:p>
+                          <a:endParaRPr lang="en-US"/>
+                        </a:p>
+                      </a:txBody>
+                      <a:tcPr/>
+                    </a:tc>
+                    <a:tc>
+                      <a:txBody>
+                        <a:bodyPr/>
+                        <a:lstStyle/>
+                        <a:p>
+                          <a:pPr algn="ctr"/>
+                          <a:endParaRPr lang="en-US" dirty="0"/>
+                        </a:p>
+                      </a:txBody>
+                      <a:tcPr/>
+                    </a:tc>
+                    <a:extLst>
+                      <a:ext uri="{0D108BD9-81ED-4DB2-BD59-A6C34878D82A}">
+                        <a16:rowId xmlns:a16="http://schemas.microsoft.com/office/drawing/2014/main" val="2782114930"/>
+                      </a:ext>
+                    </a:extLst>
+                  </a:tr>
+                  <a:tr h="365760">
+                    <a:tc>
+                      <a:txBody>
+                        <a:bodyPr/>
+                        <a:lstStyle/>
+                        <a:p>
+                          <a:endParaRPr lang="en-US"/>
+                        </a:p>
+                      </a:txBody>
+                      <a:tcPr/>
+                    </a:tc>
+                    <a:tc>
+                      <a:txBody>
+                        <a:bodyPr/>
+                        <a:lstStyle/>
+                        <a:p>
+                          <a:pPr algn="ctr"/>
+                          <a:endParaRPr lang="en-US" dirty="0"/>
+                        </a:p>
+                      </a:txBody>
+                      <a:tcPr/>
+                    </a:tc>
+                    <a:extLst>
+                      <a:ext uri="{0D108BD9-81ED-4DB2-BD59-A6C34878D82A}">
+                        <a16:rowId xmlns:a16="http://schemas.microsoft.com/office/drawing/2014/main" val="2458746661"/>
+                      </a:ext>
+                    </a:extLst>
+                  </a:tr>
+                  <a:tr h="365760">
+                    <a:tc>
+                      <a:txBody>
+                        <a:bodyPr/>
+                        <a:lstStyle/>
+                        <a:p>
+                          <a:endParaRPr lang="en-US"/>
+                        </a:p>
+                      </a:txBody>
+                      <a:tcPr/>
+                    </a:tc>
+                    <a:tc>
+                      <a:txBody>
+                        <a:bodyPr/>
+                        <a:lstStyle/>
+                        <a:p>
+                          <a:pPr algn="ctr"/>
+                          <a:endParaRPr lang="en-US"/>
+                        </a:p>
+                      </a:txBody>
+                      <a:tcPr/>
+                    </a:tc>
+                    <a:extLst>
+                      <a:ext uri="{0D108BD9-81ED-4DB2-BD59-A6C34878D82A}">
+                        <a16:rowId xmlns:a16="http://schemas.microsoft.com/office/drawing/2014/main" val="1827213602"/>
+                      </a:ext>
+                    </a:extLst>
+                  </a:tr>
+                  <a:tr h="365760">
+                    <a:tc>
+                      <a:txBody>
+                        <a:bodyPr/>
+                        <a:lstStyle/>
+                        <a:p>
+                          <a:endParaRPr lang="en-US"/>
+                        </a:p>
+                      </a:txBody>
+                      <a:tcPr/>
+                    </a:tc>
+                    <a:tc>
+                      <a:txBody>
+                        <a:bodyPr/>
+                        <a:lstStyle/>
+                        <a:p>
+                          <a:pPr algn="ctr"/>
+                          <a:endParaRPr lang="en-US" dirty="0"/>
+                        </a:p>
+                      </a:txBody>
+                      <a:tcPr/>
+                    </a:tc>
+                    <a:extLst>
+                      <a:ext uri="{0D108BD9-81ED-4DB2-BD59-A6C34878D82A}">
+                        <a16:rowId xmlns:a16="http://schemas.microsoft.com/office/drawing/2014/main" val="2623816108"/>
+                      </a:ext>
+                    </a:extLst>
+                  </a:tr>
+                  <a:tr h="365760">
+                    <a:tc>
+                      <a:txBody>
+                        <a:bodyPr/>
+                        <a:lstStyle/>
+                        <a:p>
+                          <a:endParaRPr lang="en-US"/>
+                        </a:p>
+                      </a:txBody>
+                      <a:tcPr/>
+                    </a:tc>
+                    <a:tc>
+                      <a:txBody>
+                        <a:bodyPr/>
+                        <a:lstStyle/>
+                        <a:p>
+                          <a:pPr algn="ctr"/>
+                          <a:endParaRPr lang="en-US" dirty="0"/>
+                        </a:p>
+                      </a:txBody>
+                      <a:tcPr/>
+                    </a:tc>
+                    <a:extLst>
+                      <a:ext uri="{0D108BD9-81ED-4DB2-BD59-A6C34878D82A}">
+                        <a16:rowId xmlns:a16="http://schemas.microsoft.com/office/drawing/2014/main" val="2396385500"/>
+                      </a:ext>
+                    </a:extLst>
+                  </a:tr>
+                  <a:tr h="365760">
+                    <a:tc>
+                      <a:txBody>
+                        <a:bodyPr/>
+                        <a:lstStyle/>
+                        <a:p>
+                          <a:r>
+                            <a:rPr lang="it-IT" dirty="0"/>
+                            <a:t>30</a:t>
+                          </a:r>
+                          <a:endParaRPr lang="en-US" dirty="0"/>
+                        </a:p>
+                      </a:txBody>
+                      <a:tcPr/>
+                    </a:tc>
+                    <a:tc>
+                      <a:txBody>
+                        <a:bodyPr/>
+                        <a:lstStyle/>
+                        <a:p>
+                          <a:endParaRPr lang="en-US"/>
+                        </a:p>
+                      </a:txBody>
+                      <a:tcPr>
+                        <a:blipFill>
+                          <a:blip r:embed="rId3"/>
+                          <a:stretch>
+                            <a:fillRect l="-20628" t="-908333" r="-897" b="-226667"/>
+                          </a:stretch>
+                        </a:blipFill>
+                      </a:tcPr>
+                    </a:tc>
+                    <a:extLst>
+                      <a:ext uri="{0D108BD9-81ED-4DB2-BD59-A6C34878D82A}">
+                        <a16:rowId xmlns:a16="http://schemas.microsoft.com/office/drawing/2014/main" val="1383135423"/>
+                      </a:ext>
+                    </a:extLst>
+                  </a:tr>
+                  <a:tr h="365760">
+                    <a:tc>
+                      <a:txBody>
+                        <a:bodyPr/>
+                        <a:lstStyle/>
+                        <a:p>
+                          <a:r>
+                            <a:rPr lang="it-IT" dirty="0"/>
+                            <a:t>31</a:t>
+                          </a:r>
+                          <a:endParaRPr lang="en-US" dirty="0"/>
+                        </a:p>
+                      </a:txBody>
+                      <a:tcPr/>
+                    </a:tc>
+                    <a:tc>
+                      <a:txBody>
+                        <a:bodyPr/>
+                        <a:lstStyle/>
+                        <a:p>
+                          <a:pPr algn="ctr"/>
+                          <a:r>
+                            <a:rPr lang="it-IT" dirty="0"/>
+                            <a:t>D.C.</a:t>
+                          </a:r>
+                          <a:endParaRPr lang="en-US" dirty="0"/>
+                        </a:p>
+                      </a:txBody>
+                      <a:tcPr/>
+                    </a:tc>
+                    <a:extLst>
+                      <a:ext uri="{0D108BD9-81ED-4DB2-BD59-A6C34878D82A}">
+                        <a16:rowId xmlns:a16="http://schemas.microsoft.com/office/drawing/2014/main" val="3776137944"/>
+                      </a:ext>
+                    </a:extLst>
+                  </a:tr>
+                  <a:tr h="365760">
+                    <a:tc>
+                      <a:txBody>
+                        <a:bodyPr/>
+                        <a:lstStyle/>
+                        <a:p>
+                          <a:r>
+                            <a:rPr lang="it-IT" dirty="0"/>
+                            <a:t>32</a:t>
+                          </a:r>
+                          <a:endParaRPr lang="en-US" dirty="0"/>
+                        </a:p>
+                      </a:txBody>
+                      <a:tcPr/>
+                    </a:tc>
+                    <a:tc>
+                      <a:txBody>
+                        <a:bodyPr/>
+                        <a:lstStyle/>
+                        <a:p>
+                          <a:pPr algn="ctr"/>
+                          <a:r>
+                            <a:rPr lang="it-IT" dirty="0"/>
+                            <a:t>D.C.</a:t>
+                          </a:r>
+                          <a:endParaRPr lang="en-US" dirty="0"/>
+                        </a:p>
+                      </a:txBody>
+                      <a:tcPr/>
+                    </a:tc>
+                    <a:extLst>
+                      <a:ext uri="{0D108BD9-81ED-4DB2-BD59-A6C34878D82A}">
+                        <a16:rowId xmlns:a16="http://schemas.microsoft.com/office/drawing/2014/main" val="602303420"/>
+                      </a:ext>
+                    </a:extLst>
+                  </a:tr>
+                </a:tbl>
+              </a:graphicData>
+            </a:graphic>
+          </p:graphicFrame>
+        </mc:Fallback>
+      </mc:AlternateContent>
+      <mc:AlternateContent xmlns:mc="http://schemas.openxmlformats.org/markup-compatibility/2006">
+        <mc:Choice xmlns:a14="http://schemas.microsoft.com/office/drawing/2010/main" Requires="a14">
+          <p:graphicFrame>
+            <p:nvGraphicFramePr>
+              <p:cNvPr id="31" name="Table 30">
+                <a:extLst>
+                  <a:ext uri="{FF2B5EF4-FFF2-40B4-BE49-F238E27FC236}">
+                    <a16:creationId xmlns:a16="http://schemas.microsoft.com/office/drawing/2014/main" id="{9440CE54-5CD9-C126-02FF-C786F2658D31}"/>
+                  </a:ext>
+                </a:extLst>
+              </p:cNvPr>
+              <p:cNvGraphicFramePr>
+                <a:graphicFrameLocks noGrp="1"/>
+              </p:cNvGraphicFramePr>
+              <p:nvPr>
+                <p:extLst>
+                  <p:ext uri="{D42A27DB-BD31-4B8C-83A1-F6EECF244321}">
+                    <p14:modId xmlns:p14="http://schemas.microsoft.com/office/powerpoint/2010/main" val="4125828212"/>
+                  </p:ext>
+                </p:extLst>
+              </p:nvPr>
+            </p:nvGraphicFramePr>
+            <p:xfrm>
+              <a:off x="7778118" y="1905297"/>
+              <a:ext cx="3266141" cy="4389120"/>
+            </p:xfrm>
+            <a:graphic>
+              <a:graphicData uri="http://schemas.openxmlformats.org/drawingml/2006/table">
+                <a:tbl>
+                  <a:tblPr firstRow="1" bandRow="1">
+                    <a:tableStyleId>{5C22544A-7EE6-4342-B048-85BDC9FD1C3A}</a:tableStyleId>
+                  </a:tblPr>
+                  <a:tblGrid>
+                    <a:gridCol w="553094">
+                      <a:extLst>
+                        <a:ext uri="{9D8B030D-6E8A-4147-A177-3AD203B41FA5}">
+                          <a16:colId xmlns:a16="http://schemas.microsoft.com/office/drawing/2014/main" val="1309924922"/>
+                        </a:ext>
+                      </a:extLst>
+                    </a:gridCol>
+                    <a:gridCol w="2713047">
+                      <a:extLst>
+                        <a:ext uri="{9D8B030D-6E8A-4147-A177-3AD203B41FA5}">
+                          <a16:colId xmlns:a16="http://schemas.microsoft.com/office/drawing/2014/main" val="935044674"/>
+                        </a:ext>
+                      </a:extLst>
+                    </a:gridCol>
+                  </a:tblGrid>
+                  <a:tr h="280653">
+                    <a:tc>
+                      <a:txBody>
+                        <a:bodyPr/>
+                        <a:lstStyle/>
+                        <a:p>
+                          <a:r>
+                            <a:rPr lang="it-IT" dirty="0"/>
+                            <a:t>0</a:t>
+                          </a:r>
+                          <a:endParaRPr lang="en-US" dirty="0"/>
+                        </a:p>
+                      </a:txBody>
+                      <a:tcPr/>
+                    </a:tc>
+                    <a:tc>
+                      <a:txBody>
+                        <a:bodyPr/>
+                        <a:lstStyle/>
+                        <a:p>
+                          <a:pPr algn="ctr"/>
+                          <a:endParaRPr lang="en-US" dirty="0"/>
+                        </a:p>
+                      </a:txBody>
+                      <a:tcPr/>
+                    </a:tc>
+                    <a:extLst>
+                      <a:ext uri="{0D108BD9-81ED-4DB2-BD59-A6C34878D82A}">
+                        <a16:rowId xmlns:a16="http://schemas.microsoft.com/office/drawing/2014/main" val="175597731"/>
+                      </a:ext>
+                    </a:extLst>
+                  </a:tr>
+                  <a:tr h="280653">
+                    <a:tc>
+                      <a:txBody>
+                        <a:bodyPr/>
+                        <a:lstStyle/>
+                        <a:p>
+                          <a:r>
+                            <a:rPr lang="it-IT" dirty="0"/>
+                            <a:t>1</a:t>
+                          </a:r>
+                          <a:endParaRPr lang="en-US" dirty="0"/>
+                        </a:p>
+                      </a:txBody>
+                      <a:tcPr/>
+                    </a:tc>
+                    <a:tc>
+                      <a:txBody>
+                        <a:bodyPr/>
+                        <a:lstStyle/>
+                        <a:p>
+                          <a:pPr algn="ctr"/>
+                          <a14:m>
+                            <m:oMathPara xmlns:m="http://schemas.openxmlformats.org/officeDocument/2006/math">
+                              <m:oMathParaPr>
+                                <m:jc m:val="centerGroup"/>
+                              </m:oMathParaPr>
+                              <m:oMath xmlns:m="http://schemas.openxmlformats.org/officeDocument/2006/math">
+                                <m:sSub>
+                                  <m:sSubPr>
+                                    <m:ctrlPr>
+                                      <a:rPr lang="it-IT" b="0" i="1" smtClean="0">
+                                        <a:latin typeface="Cambria Math" panose="02040503050406030204" pitchFamily="18" charset="0"/>
+                                      </a:rPr>
+                                    </m:ctrlPr>
+                                  </m:sSubPr>
+                                  <m:e>
+                                    <m:r>
+                                      <a:rPr lang="it-IT" b="0" i="1" smtClean="0">
+                                        <a:latin typeface="Cambria Math" panose="02040503050406030204" pitchFamily="18" charset="0"/>
+                                      </a:rPr>
+                                      <m:t>𝑤</m:t>
+                                    </m:r>
+                                  </m:e>
+                                  <m:sub>
+                                    <m:r>
+                                      <m:rPr>
+                                        <m:sty m:val="p"/>
+                                      </m:rPr>
+                                      <a:rPr lang="it-IT" b="0" i="0" smtClean="0">
+                                        <a:latin typeface="Cambria Math" panose="02040503050406030204" pitchFamily="18" charset="0"/>
+                                      </a:rPr>
+                                      <m:t>sum</m:t>
+                                    </m:r>
+                                  </m:sub>
+                                </m:sSub>
+                                <m:r>
+                                  <a:rPr lang="it-IT" b="0" i="1" smtClean="0">
+                                    <a:latin typeface="Cambria Math" panose="02040503050406030204" pitchFamily="18" charset="0"/>
+                                  </a:rPr>
+                                  <m:t>(</m:t>
+                                </m:r>
+                                <m:r>
+                                  <a:rPr lang="it-IT" b="0" i="1" smtClean="0">
+                                    <a:latin typeface="Cambria Math" panose="02040503050406030204" pitchFamily="18" charset="0"/>
+                                  </a:rPr>
+                                  <m:t>1</m:t>
+                                </m:r>
+                                <m:r>
+                                  <a:rPr lang="it-IT" b="0" i="1" smtClean="0">
+                                    <a:latin typeface="Cambria Math" panose="02040503050406030204" pitchFamily="18" charset="0"/>
+                                  </a:rPr>
+                                  <m:t>)</m:t>
+                                </m:r>
+                              </m:oMath>
+                            </m:oMathPara>
+                          </a14:m>
+                          <a:endParaRPr lang="en-US" dirty="0"/>
+                        </a:p>
+                      </a:txBody>
+                      <a:tcPr/>
+                    </a:tc>
+                    <a:extLst>
+                      <a:ext uri="{0D108BD9-81ED-4DB2-BD59-A6C34878D82A}">
+                        <a16:rowId xmlns:a16="http://schemas.microsoft.com/office/drawing/2014/main" val="10764930"/>
+                      </a:ext>
+                    </a:extLst>
+                  </a:tr>
+                  <a:tr h="280653">
+                    <a:tc>
+                      <a:txBody>
+                        <a:bodyPr/>
+                        <a:lstStyle/>
+                        <a:p>
+                          <a:r>
+                            <a:rPr lang="it-IT" dirty="0"/>
+                            <a:t>2</a:t>
+                          </a:r>
+                          <a:endParaRPr lang="en-US" dirty="0"/>
+                        </a:p>
+                      </a:txBody>
+                      <a:tcPr/>
+                    </a:tc>
+                    <a:tc>
+                      <a:txBody>
+                        <a:bodyPr/>
+                        <a:lstStyle/>
+                        <a:p>
+                          <a:pPr algn="ctr"/>
+                          <a14:m>
+                            <m:oMathPara xmlns:m="http://schemas.openxmlformats.org/officeDocument/2006/math">
+                              <m:oMathParaPr>
+                                <m:jc m:val="centerGroup"/>
+                              </m:oMathParaPr>
+                              <m:oMath xmlns:m="http://schemas.openxmlformats.org/officeDocument/2006/math">
+                                <m:sSub>
+                                  <m:sSubPr>
+                                    <m:ctrlPr>
+                                      <a:rPr lang="it-IT" b="0" i="1" smtClean="0">
+                                        <a:latin typeface="Cambria Math" panose="02040503050406030204" pitchFamily="18" charset="0"/>
+                                      </a:rPr>
+                                    </m:ctrlPr>
+                                  </m:sSubPr>
+                                  <m:e>
+                                    <m:r>
+                                      <a:rPr lang="it-IT" b="0" i="1" smtClean="0">
+                                        <a:latin typeface="Cambria Math" panose="02040503050406030204" pitchFamily="18" charset="0"/>
+                                      </a:rPr>
+                                      <m:t>𝑤</m:t>
+                                    </m:r>
+                                  </m:e>
+                                  <m:sub>
+                                    <m:r>
+                                      <m:rPr>
+                                        <m:sty m:val="p"/>
+                                      </m:rPr>
+                                      <a:rPr lang="it-IT" b="0" i="0" smtClean="0">
+                                        <a:latin typeface="Cambria Math" panose="02040503050406030204" pitchFamily="18" charset="0"/>
+                                      </a:rPr>
+                                      <m:t>sum</m:t>
+                                    </m:r>
+                                  </m:sub>
+                                </m:sSub>
+                                <m:r>
+                                  <a:rPr lang="it-IT" b="0" i="1" smtClean="0">
+                                    <a:latin typeface="Cambria Math" panose="02040503050406030204" pitchFamily="18" charset="0"/>
+                                  </a:rPr>
+                                  <m:t>(</m:t>
+                                </m:r>
+                                <m:r>
+                                  <a:rPr lang="it-IT" b="0" i="1" smtClean="0">
+                                    <a:latin typeface="Cambria Math" panose="02040503050406030204" pitchFamily="18" charset="0"/>
+                                  </a:rPr>
+                                  <m:t>2</m:t>
+                                </m:r>
+                                <m:r>
+                                  <a:rPr lang="it-IT" b="0" i="1" smtClean="0">
+                                    <a:latin typeface="Cambria Math" panose="02040503050406030204" pitchFamily="18" charset="0"/>
+                                  </a:rPr>
+                                  <m:t>)</m:t>
+                                </m:r>
+                              </m:oMath>
+                            </m:oMathPara>
+                          </a14:m>
+                          <a:endParaRPr lang="en-US" dirty="0"/>
+                        </a:p>
+                      </a:txBody>
+                      <a:tcPr/>
+                    </a:tc>
+                    <a:extLst>
+                      <a:ext uri="{0D108BD9-81ED-4DB2-BD59-A6C34878D82A}">
+                        <a16:rowId xmlns:a16="http://schemas.microsoft.com/office/drawing/2014/main" val="2033447407"/>
+                      </a:ext>
+                    </a:extLst>
+                  </a:tr>
+                  <a:tr h="280653">
+                    <a:tc>
+                      <a:txBody>
+                        <a:bodyPr/>
+                        <a:lstStyle/>
+                        <a:p>
+                          <a:endParaRPr lang="en-US"/>
+                        </a:p>
+                      </a:txBody>
+                      <a:tcPr/>
+                    </a:tc>
+                    <a:tc>
+                      <a:txBody>
+                        <a:bodyPr/>
+                        <a:lstStyle/>
+                        <a:p>
+                          <a:pPr algn="ctr"/>
+                          <a:endParaRPr lang="en-US" dirty="0"/>
+                        </a:p>
+                      </a:txBody>
+                      <a:tcPr/>
+                    </a:tc>
+                    <a:extLst>
+                      <a:ext uri="{0D108BD9-81ED-4DB2-BD59-A6C34878D82A}">
+                        <a16:rowId xmlns:a16="http://schemas.microsoft.com/office/drawing/2014/main" val="2584797129"/>
+                      </a:ext>
+                    </a:extLst>
+                  </a:tr>
+                  <a:tr h="280653">
+                    <a:tc>
+                      <a:txBody>
+                        <a:bodyPr/>
+                        <a:lstStyle/>
+                        <a:p>
+                          <a:endParaRPr lang="en-US"/>
+                        </a:p>
+                      </a:txBody>
+                      <a:tcPr/>
+                    </a:tc>
+                    <a:tc>
+                      <a:txBody>
+                        <a:bodyPr/>
+                        <a:lstStyle/>
+                        <a:p>
+                          <a:pPr algn="ctr"/>
+                          <a:endParaRPr lang="en-US" dirty="0"/>
+                        </a:p>
+                      </a:txBody>
+                      <a:tcPr/>
+                    </a:tc>
+                    <a:extLst>
+                      <a:ext uri="{0D108BD9-81ED-4DB2-BD59-A6C34878D82A}">
+                        <a16:rowId xmlns:a16="http://schemas.microsoft.com/office/drawing/2014/main" val="2782114930"/>
+                      </a:ext>
+                    </a:extLst>
+                  </a:tr>
+                  <a:tr h="280653">
+                    <a:tc>
+                      <a:txBody>
+                        <a:bodyPr/>
+                        <a:lstStyle/>
+                        <a:p>
+                          <a:endParaRPr lang="en-US"/>
+                        </a:p>
+                      </a:txBody>
+                      <a:tcPr/>
+                    </a:tc>
+                    <a:tc>
+                      <a:txBody>
+                        <a:bodyPr/>
+                        <a:lstStyle/>
+                        <a:p>
+                          <a:pPr algn="ctr"/>
+                          <a:endParaRPr lang="en-US"/>
+                        </a:p>
+                      </a:txBody>
+                      <a:tcPr/>
+                    </a:tc>
+                    <a:extLst>
+                      <a:ext uri="{0D108BD9-81ED-4DB2-BD59-A6C34878D82A}">
+                        <a16:rowId xmlns:a16="http://schemas.microsoft.com/office/drawing/2014/main" val="2458746661"/>
+                      </a:ext>
+                    </a:extLst>
+                  </a:tr>
+                  <a:tr h="280653">
+                    <a:tc>
+                      <a:txBody>
+                        <a:bodyPr/>
+                        <a:lstStyle/>
+                        <a:p>
+                          <a:endParaRPr lang="en-US"/>
+                        </a:p>
+                      </a:txBody>
+                      <a:tcPr/>
+                    </a:tc>
+                    <a:tc>
+                      <a:txBody>
+                        <a:bodyPr/>
+                        <a:lstStyle/>
+                        <a:p>
+                          <a:pPr algn="ctr"/>
+                          <a:endParaRPr lang="en-US" dirty="0"/>
+                        </a:p>
+                      </a:txBody>
+                      <a:tcPr/>
+                    </a:tc>
+                    <a:extLst>
+                      <a:ext uri="{0D108BD9-81ED-4DB2-BD59-A6C34878D82A}">
+                        <a16:rowId xmlns:a16="http://schemas.microsoft.com/office/drawing/2014/main" val="1827213602"/>
+                      </a:ext>
+                    </a:extLst>
+                  </a:tr>
+                  <a:tr h="280653">
+                    <a:tc>
+                      <a:txBody>
+                        <a:bodyPr/>
+                        <a:lstStyle/>
+                        <a:p>
+                          <a:endParaRPr lang="en-US"/>
+                        </a:p>
+                      </a:txBody>
+                      <a:tcPr/>
+                    </a:tc>
+                    <a:tc>
+                      <a:txBody>
+                        <a:bodyPr/>
+                        <a:lstStyle/>
+                        <a:p>
+                          <a:pPr algn="ctr"/>
+                          <a:endParaRPr lang="en-US" dirty="0"/>
+                        </a:p>
+                      </a:txBody>
+                      <a:tcPr/>
+                    </a:tc>
+                    <a:extLst>
+                      <a:ext uri="{0D108BD9-81ED-4DB2-BD59-A6C34878D82A}">
+                        <a16:rowId xmlns:a16="http://schemas.microsoft.com/office/drawing/2014/main" val="2623816108"/>
+                      </a:ext>
+                    </a:extLst>
+                  </a:tr>
+                  <a:tr h="280653">
+                    <a:tc>
+                      <a:txBody>
+                        <a:bodyPr/>
+                        <a:lstStyle/>
+                        <a:p>
+                          <a:endParaRPr lang="en-US" dirty="0"/>
+                        </a:p>
+                      </a:txBody>
+                      <a:tcPr/>
+                    </a:tc>
+                    <a:tc>
+                      <a:txBody>
+                        <a:bodyPr/>
+                        <a:lstStyle/>
+                        <a:p>
+                          <a:pPr algn="ctr"/>
+                          <a:endParaRPr lang="en-US" dirty="0"/>
+                        </a:p>
+                      </a:txBody>
+                      <a:tcPr/>
+                    </a:tc>
+                    <a:extLst>
+                      <a:ext uri="{0D108BD9-81ED-4DB2-BD59-A6C34878D82A}">
+                        <a16:rowId xmlns:a16="http://schemas.microsoft.com/office/drawing/2014/main" val="2396385500"/>
+                      </a:ext>
+                    </a:extLst>
+                  </a:tr>
+                  <a:tr h="280653">
+                    <a:tc>
+                      <a:txBody>
+                        <a:bodyPr/>
+                        <a:lstStyle/>
+                        <a:p>
+                          <a:r>
+                            <a:rPr lang="it-IT" dirty="0"/>
+                            <a:t>30</a:t>
+                          </a:r>
+                          <a:endParaRPr lang="en-US" dirty="0"/>
+                        </a:p>
+                      </a:txBody>
+                      <a:tcPr/>
+                    </a:tc>
+                    <a:tc>
+                      <a:txBody>
+                        <a:bodyPr/>
+                        <a:lstStyle/>
+                        <a:p>
+                          <a:pPr algn="ctr"/>
+                          <a14:m>
+                            <m:oMathPara xmlns:m="http://schemas.openxmlformats.org/officeDocument/2006/math">
+                              <m:oMathParaPr>
+                                <m:jc m:val="centerGroup"/>
+                              </m:oMathParaPr>
+                              <m:oMath xmlns:m="http://schemas.openxmlformats.org/officeDocument/2006/math">
+                                <m:sSub>
+                                  <m:sSubPr>
+                                    <m:ctrlPr>
+                                      <a:rPr lang="it-IT" b="0" i="1" smtClean="0">
+                                        <a:latin typeface="Cambria Math" panose="02040503050406030204" pitchFamily="18" charset="0"/>
+                                      </a:rPr>
+                                    </m:ctrlPr>
+                                  </m:sSubPr>
+                                  <m:e>
+                                    <m:r>
+                                      <a:rPr lang="it-IT" b="0" i="1" smtClean="0">
+                                        <a:latin typeface="Cambria Math" panose="02040503050406030204" pitchFamily="18" charset="0"/>
+                                      </a:rPr>
+                                      <m:t>𝑤</m:t>
+                                    </m:r>
+                                  </m:e>
+                                  <m:sub>
+                                    <m:r>
+                                      <m:rPr>
+                                        <m:sty m:val="p"/>
+                                      </m:rPr>
+                                      <a:rPr lang="it-IT" b="0" i="0" smtClean="0">
+                                        <a:latin typeface="Cambria Math" panose="02040503050406030204" pitchFamily="18" charset="0"/>
+                                      </a:rPr>
+                                      <m:t>sum</m:t>
+                                    </m:r>
+                                  </m:sub>
+                                </m:sSub>
+                                <m:r>
+                                  <a:rPr lang="it-IT" b="0" i="1" smtClean="0">
+                                    <a:latin typeface="Cambria Math" panose="02040503050406030204" pitchFamily="18" charset="0"/>
+                                  </a:rPr>
+                                  <m:t>(</m:t>
+                                </m:r>
+                                <m:r>
+                                  <a:rPr lang="it-IT" b="0" i="1" smtClean="0">
+                                    <a:latin typeface="Cambria Math" panose="02040503050406030204" pitchFamily="18" charset="0"/>
+                                  </a:rPr>
+                                  <m:t>30</m:t>
+                                </m:r>
+                                <m:r>
+                                  <a:rPr lang="it-IT" b="0" i="1" smtClean="0">
+                                    <a:latin typeface="Cambria Math" panose="02040503050406030204" pitchFamily="18" charset="0"/>
+                                  </a:rPr>
+                                  <m:t>)</m:t>
+                                </m:r>
+                              </m:oMath>
+                            </m:oMathPara>
+                          </a14:m>
+                          <a:endParaRPr lang="en-US" dirty="0"/>
+                        </a:p>
+                      </a:txBody>
+                      <a:tcPr/>
+                    </a:tc>
+                    <a:extLst>
+                      <a:ext uri="{0D108BD9-81ED-4DB2-BD59-A6C34878D82A}">
+                        <a16:rowId xmlns:a16="http://schemas.microsoft.com/office/drawing/2014/main" val="1383135423"/>
+                      </a:ext>
+                    </a:extLst>
+                  </a:tr>
+                  <a:tr h="280653">
+                    <a:tc>
+                      <a:txBody>
+                        <a:bodyPr/>
+                        <a:lstStyle/>
+                        <a:p>
+                          <a:r>
+                            <a:rPr lang="it-IT" dirty="0"/>
+                            <a:t>31</a:t>
+                          </a:r>
+                          <a:endParaRPr lang="en-US" dirty="0"/>
+                        </a:p>
+                      </a:txBody>
+                      <a:tcPr/>
+                    </a:tc>
+                    <a:tc>
+                      <a:txBody>
+                        <a:bodyPr/>
+                        <a:lstStyle/>
+                        <a:p>
+                          <a:pPr algn="ctr"/>
+                          <a14:m>
+                            <m:oMathPara xmlns:m="http://schemas.openxmlformats.org/officeDocument/2006/math">
+                              <m:oMathParaPr>
+                                <m:jc m:val="centerGroup"/>
+                              </m:oMathParaPr>
+                              <m:oMath xmlns:m="http://schemas.openxmlformats.org/officeDocument/2006/math">
+                                <m:r>
+                                  <a:rPr lang="it-IT" b="0" i="1" smtClean="0">
+                                    <a:latin typeface="Cambria Math" panose="02040503050406030204" pitchFamily="18" charset="0"/>
+                                  </a:rPr>
+                                  <m:t>𝑐𝑜𝑢𝑛𝑡𝑒𝑟</m:t>
+                                </m:r>
+                                <m:r>
+                                  <a:rPr lang="it-IT" b="0" i="1" smtClean="0">
+                                    <a:latin typeface="Cambria Math" panose="02040503050406030204" pitchFamily="18" charset="0"/>
+                                  </a:rPr>
+                                  <m:t> </m:t>
+                                </m:r>
+                                <m:r>
+                                  <a:rPr lang="it-IT" b="0" i="1" smtClean="0">
+                                    <a:latin typeface="Cambria Math" panose="02040503050406030204" pitchFamily="18" charset="0"/>
+                                  </a:rPr>
+                                  <m:t>𝑣𝑎𝑙𝑢𝑒</m:t>
+                                </m:r>
+                              </m:oMath>
+                            </m:oMathPara>
+                          </a14:m>
+                          <a:endParaRPr lang="it-IT" b="0" dirty="0"/>
+                        </a:p>
+                      </a:txBody>
+                      <a:tcPr/>
+                    </a:tc>
+                    <a:extLst>
+                      <a:ext uri="{0D108BD9-81ED-4DB2-BD59-A6C34878D82A}">
+                        <a16:rowId xmlns:a16="http://schemas.microsoft.com/office/drawing/2014/main" val="3776137944"/>
+                      </a:ext>
+                    </a:extLst>
+                  </a:tr>
+                  <a:tr h="280653">
+                    <a:tc>
+                      <a:txBody>
+                        <a:bodyPr/>
+                        <a:lstStyle/>
+                        <a:p>
+                          <a:r>
+                            <a:rPr lang="it-IT" dirty="0"/>
+                            <a:t>32</a:t>
+                          </a:r>
+                          <a:endParaRPr lang="en-US" dirty="0"/>
+                        </a:p>
+                      </a:txBody>
+                      <a:tcPr/>
+                    </a:tc>
+                    <a:tc>
+                      <a:txBody>
+                        <a:bodyPr/>
+                        <a:lstStyle/>
+                        <a:p>
+                          <a:pPr algn="ctr"/>
+                          <a14:m>
+                            <m:oMathPara xmlns:m="http://schemas.openxmlformats.org/officeDocument/2006/math">
+                              <m:oMathParaPr>
+                                <m:jc m:val="centerGroup"/>
+                              </m:oMathParaPr>
+                              <m:oMath xmlns:m="http://schemas.openxmlformats.org/officeDocument/2006/math">
+                                <m:r>
+                                  <a:rPr lang="it-IT" b="0" i="1" smtClean="0">
+                                    <a:latin typeface="Cambria Math" panose="02040503050406030204" pitchFamily="18" charset="0"/>
+                                  </a:rPr>
+                                  <m:t>𝐹𝑆𝑀</m:t>
+                                </m:r>
+                                <m:r>
+                                  <a:rPr lang="it-IT" b="0" i="1" smtClean="0">
+                                    <a:latin typeface="Cambria Math" panose="02040503050406030204" pitchFamily="18" charset="0"/>
+                                  </a:rPr>
+                                  <m:t> </m:t>
+                                </m:r>
+                                <m:r>
+                                  <a:rPr lang="it-IT" b="0" i="1" smtClean="0">
+                                    <a:latin typeface="Cambria Math" panose="02040503050406030204" pitchFamily="18" charset="0"/>
+                                  </a:rPr>
+                                  <m:t>𝑠𝑡𝑎𝑡𝑒</m:t>
+                                </m:r>
+                              </m:oMath>
+                            </m:oMathPara>
+                          </a14:m>
+                          <a:endParaRPr lang="en-US" dirty="0"/>
+                        </a:p>
+                      </a:txBody>
+                      <a:tcPr/>
+                    </a:tc>
+                    <a:extLst>
+                      <a:ext uri="{0D108BD9-81ED-4DB2-BD59-A6C34878D82A}">
+                        <a16:rowId xmlns:a16="http://schemas.microsoft.com/office/drawing/2014/main" val="602303420"/>
+                      </a:ext>
+                    </a:extLst>
+                  </a:tr>
+                </a:tbl>
+              </a:graphicData>
+            </a:graphic>
+          </p:graphicFrame>
+        </mc:Choice>
+        <mc:Fallback>
+          <p:graphicFrame>
+            <p:nvGraphicFramePr>
+              <p:cNvPr id="31" name="Table 30">
+                <a:extLst>
+                  <a:ext uri="{FF2B5EF4-FFF2-40B4-BE49-F238E27FC236}">
+                    <a16:creationId xmlns:a16="http://schemas.microsoft.com/office/drawing/2014/main" id="{9440CE54-5CD9-C126-02FF-C786F2658D31}"/>
+                  </a:ext>
+                </a:extLst>
+              </p:cNvPr>
+              <p:cNvGraphicFramePr>
+                <a:graphicFrameLocks noGrp="1"/>
+              </p:cNvGraphicFramePr>
+              <p:nvPr>
+                <p:extLst>
+                  <p:ext uri="{D42A27DB-BD31-4B8C-83A1-F6EECF244321}">
+                    <p14:modId xmlns:p14="http://schemas.microsoft.com/office/powerpoint/2010/main" val="4125828212"/>
+                  </p:ext>
+                </p:extLst>
+              </p:nvPr>
+            </p:nvGraphicFramePr>
+            <p:xfrm>
+              <a:off x="7778118" y="1905297"/>
+              <a:ext cx="3266141" cy="4389120"/>
+            </p:xfrm>
+            <a:graphic>
+              <a:graphicData uri="http://schemas.openxmlformats.org/drawingml/2006/table">
+                <a:tbl>
+                  <a:tblPr firstRow="1" bandRow="1">
+                    <a:tableStyleId>{5C22544A-7EE6-4342-B048-85BDC9FD1C3A}</a:tableStyleId>
+                  </a:tblPr>
+                  <a:tblGrid>
+                    <a:gridCol w="553094">
+                      <a:extLst>
+                        <a:ext uri="{9D8B030D-6E8A-4147-A177-3AD203B41FA5}">
+                          <a16:colId xmlns:a16="http://schemas.microsoft.com/office/drawing/2014/main" val="1309924922"/>
+                        </a:ext>
+                      </a:extLst>
+                    </a:gridCol>
+                    <a:gridCol w="2713047">
+                      <a:extLst>
+                        <a:ext uri="{9D8B030D-6E8A-4147-A177-3AD203B41FA5}">
+                          <a16:colId xmlns:a16="http://schemas.microsoft.com/office/drawing/2014/main" val="935044674"/>
+                        </a:ext>
+                      </a:extLst>
+                    </a:gridCol>
+                  </a:tblGrid>
+                  <a:tr h="365760">
+                    <a:tc>
+                      <a:txBody>
+                        <a:bodyPr/>
+                        <a:lstStyle/>
+                        <a:p>
+                          <a:r>
+                            <a:rPr lang="it-IT" dirty="0"/>
+                            <a:t>0</a:t>
+                          </a:r>
+                          <a:endParaRPr lang="en-US" dirty="0"/>
+                        </a:p>
+                      </a:txBody>
+                      <a:tcPr/>
+                    </a:tc>
+                    <a:tc>
+                      <a:txBody>
+                        <a:bodyPr/>
+                        <a:lstStyle/>
+                        <a:p>
+                          <a:pPr algn="ctr"/>
+                          <a:endParaRPr lang="en-US" dirty="0"/>
+                        </a:p>
+                      </a:txBody>
+                      <a:tcPr/>
+                    </a:tc>
+                    <a:extLst>
+                      <a:ext uri="{0D108BD9-81ED-4DB2-BD59-A6C34878D82A}">
+                        <a16:rowId xmlns:a16="http://schemas.microsoft.com/office/drawing/2014/main" val="175597731"/>
+                      </a:ext>
+                    </a:extLst>
+                  </a:tr>
+                  <a:tr h="365760">
+                    <a:tc>
+                      <a:txBody>
+                        <a:bodyPr/>
+                        <a:lstStyle/>
+                        <a:p>
+                          <a:r>
+                            <a:rPr lang="it-IT" dirty="0"/>
+                            <a:t>1</a:t>
+                          </a:r>
+                          <a:endParaRPr lang="en-US" dirty="0"/>
+                        </a:p>
+                      </a:txBody>
+                      <a:tcPr/>
+                    </a:tc>
+                    <a:tc>
+                      <a:txBody>
+                        <a:bodyPr/>
+                        <a:lstStyle/>
+                        <a:p>
+                          <a:endParaRPr lang="en-US"/>
+                        </a:p>
+                      </a:txBody>
+                      <a:tcPr>
+                        <a:blipFill>
+                          <a:blip r:embed="rId4"/>
+                          <a:stretch>
+                            <a:fillRect l="-20628" t="-106667" r="-897" b="-1028333"/>
+                          </a:stretch>
+                        </a:blipFill>
+                      </a:tcPr>
+                    </a:tc>
+                    <a:extLst>
+                      <a:ext uri="{0D108BD9-81ED-4DB2-BD59-A6C34878D82A}">
+                        <a16:rowId xmlns:a16="http://schemas.microsoft.com/office/drawing/2014/main" val="10764930"/>
+                      </a:ext>
+                    </a:extLst>
+                  </a:tr>
+                  <a:tr h="365760">
+                    <a:tc>
+                      <a:txBody>
+                        <a:bodyPr/>
+                        <a:lstStyle/>
+                        <a:p>
+                          <a:r>
+                            <a:rPr lang="it-IT" dirty="0"/>
+                            <a:t>2</a:t>
+                          </a:r>
+                          <a:endParaRPr lang="en-US" dirty="0"/>
+                        </a:p>
+                      </a:txBody>
+                      <a:tcPr/>
+                    </a:tc>
+                    <a:tc>
+                      <a:txBody>
+                        <a:bodyPr/>
+                        <a:lstStyle/>
+                        <a:p>
+                          <a:endParaRPr lang="en-US"/>
+                        </a:p>
+                      </a:txBody>
+                      <a:tcPr>
+                        <a:blipFill>
+                          <a:blip r:embed="rId4"/>
+                          <a:stretch>
+                            <a:fillRect l="-20628" t="-206667" r="-897" b="-928333"/>
+                          </a:stretch>
+                        </a:blipFill>
+                      </a:tcPr>
+                    </a:tc>
+                    <a:extLst>
+                      <a:ext uri="{0D108BD9-81ED-4DB2-BD59-A6C34878D82A}">
+                        <a16:rowId xmlns:a16="http://schemas.microsoft.com/office/drawing/2014/main" val="2033447407"/>
+                      </a:ext>
+                    </a:extLst>
+                  </a:tr>
+                  <a:tr h="365760">
+                    <a:tc>
+                      <a:txBody>
+                        <a:bodyPr/>
+                        <a:lstStyle/>
+                        <a:p>
+                          <a:endParaRPr lang="en-US"/>
+                        </a:p>
+                      </a:txBody>
+                      <a:tcPr/>
+                    </a:tc>
+                    <a:tc>
+                      <a:txBody>
+                        <a:bodyPr/>
+                        <a:lstStyle/>
+                        <a:p>
+                          <a:pPr algn="ctr"/>
+                          <a:endParaRPr lang="en-US" dirty="0"/>
+                        </a:p>
+                      </a:txBody>
+                      <a:tcPr/>
+                    </a:tc>
+                    <a:extLst>
+                      <a:ext uri="{0D108BD9-81ED-4DB2-BD59-A6C34878D82A}">
+                        <a16:rowId xmlns:a16="http://schemas.microsoft.com/office/drawing/2014/main" val="2584797129"/>
+                      </a:ext>
+                    </a:extLst>
+                  </a:tr>
+                  <a:tr h="365760">
+                    <a:tc>
+                      <a:txBody>
+                        <a:bodyPr/>
+                        <a:lstStyle/>
+                        <a:p>
+                          <a:endParaRPr lang="en-US"/>
+                        </a:p>
+                      </a:txBody>
+                      <a:tcPr/>
+                    </a:tc>
+                    <a:tc>
+                      <a:txBody>
+                        <a:bodyPr/>
+                        <a:lstStyle/>
+                        <a:p>
+                          <a:pPr algn="ctr"/>
+                          <a:endParaRPr lang="en-US" dirty="0"/>
+                        </a:p>
+                      </a:txBody>
+                      <a:tcPr/>
+                    </a:tc>
+                    <a:extLst>
+                      <a:ext uri="{0D108BD9-81ED-4DB2-BD59-A6C34878D82A}">
+                        <a16:rowId xmlns:a16="http://schemas.microsoft.com/office/drawing/2014/main" val="2782114930"/>
+                      </a:ext>
+                    </a:extLst>
+                  </a:tr>
+                  <a:tr h="365760">
+                    <a:tc>
+                      <a:txBody>
+                        <a:bodyPr/>
+                        <a:lstStyle/>
+                        <a:p>
+                          <a:endParaRPr lang="en-US"/>
+                        </a:p>
+                      </a:txBody>
+                      <a:tcPr/>
+                    </a:tc>
+                    <a:tc>
+                      <a:txBody>
+                        <a:bodyPr/>
+                        <a:lstStyle/>
+                        <a:p>
+                          <a:pPr algn="ctr"/>
+                          <a:endParaRPr lang="en-US"/>
+                        </a:p>
+                      </a:txBody>
+                      <a:tcPr/>
+                    </a:tc>
+                    <a:extLst>
+                      <a:ext uri="{0D108BD9-81ED-4DB2-BD59-A6C34878D82A}">
+                        <a16:rowId xmlns:a16="http://schemas.microsoft.com/office/drawing/2014/main" val="2458746661"/>
+                      </a:ext>
+                    </a:extLst>
+                  </a:tr>
+                  <a:tr h="365760">
+                    <a:tc>
+                      <a:txBody>
+                        <a:bodyPr/>
+                        <a:lstStyle/>
+                        <a:p>
+                          <a:endParaRPr lang="en-US"/>
+                        </a:p>
+                      </a:txBody>
+                      <a:tcPr/>
+                    </a:tc>
+                    <a:tc>
+                      <a:txBody>
+                        <a:bodyPr/>
+                        <a:lstStyle/>
+                        <a:p>
+                          <a:pPr algn="ctr"/>
+                          <a:endParaRPr lang="en-US" dirty="0"/>
+                        </a:p>
+                      </a:txBody>
+                      <a:tcPr/>
+                    </a:tc>
+                    <a:extLst>
+                      <a:ext uri="{0D108BD9-81ED-4DB2-BD59-A6C34878D82A}">
+                        <a16:rowId xmlns:a16="http://schemas.microsoft.com/office/drawing/2014/main" val="1827213602"/>
+                      </a:ext>
+                    </a:extLst>
+                  </a:tr>
+                  <a:tr h="365760">
+                    <a:tc>
+                      <a:txBody>
+                        <a:bodyPr/>
+                        <a:lstStyle/>
+                        <a:p>
+                          <a:endParaRPr lang="en-US"/>
+                        </a:p>
+                      </a:txBody>
+                      <a:tcPr/>
+                    </a:tc>
+                    <a:tc>
+                      <a:txBody>
+                        <a:bodyPr/>
+                        <a:lstStyle/>
+                        <a:p>
+                          <a:pPr algn="ctr"/>
+                          <a:endParaRPr lang="en-US" dirty="0"/>
+                        </a:p>
+                      </a:txBody>
+                      <a:tcPr/>
+                    </a:tc>
+                    <a:extLst>
+                      <a:ext uri="{0D108BD9-81ED-4DB2-BD59-A6C34878D82A}">
+                        <a16:rowId xmlns:a16="http://schemas.microsoft.com/office/drawing/2014/main" val="2623816108"/>
+                      </a:ext>
+                    </a:extLst>
+                  </a:tr>
+                  <a:tr h="365760">
+                    <a:tc>
+                      <a:txBody>
+                        <a:bodyPr/>
+                        <a:lstStyle/>
+                        <a:p>
+                          <a:endParaRPr lang="en-US" dirty="0"/>
+                        </a:p>
+                      </a:txBody>
+                      <a:tcPr/>
+                    </a:tc>
+                    <a:tc>
+                      <a:txBody>
+                        <a:bodyPr/>
+                        <a:lstStyle/>
+                        <a:p>
+                          <a:pPr algn="ctr"/>
+                          <a:endParaRPr lang="en-US" dirty="0"/>
+                        </a:p>
+                      </a:txBody>
+                      <a:tcPr/>
+                    </a:tc>
+                    <a:extLst>
+                      <a:ext uri="{0D108BD9-81ED-4DB2-BD59-A6C34878D82A}">
+                        <a16:rowId xmlns:a16="http://schemas.microsoft.com/office/drawing/2014/main" val="2396385500"/>
+                      </a:ext>
+                    </a:extLst>
+                  </a:tr>
+                  <a:tr h="365760">
+                    <a:tc>
+                      <a:txBody>
+                        <a:bodyPr/>
+                        <a:lstStyle/>
+                        <a:p>
+                          <a:r>
+                            <a:rPr lang="it-IT" dirty="0"/>
+                            <a:t>30</a:t>
+                          </a:r>
+                          <a:endParaRPr lang="en-US" dirty="0"/>
+                        </a:p>
+                      </a:txBody>
+                      <a:tcPr/>
+                    </a:tc>
+                    <a:tc>
+                      <a:txBody>
+                        <a:bodyPr/>
+                        <a:lstStyle/>
+                        <a:p>
+                          <a:endParaRPr lang="en-US"/>
+                        </a:p>
+                      </a:txBody>
+                      <a:tcPr>
+                        <a:blipFill>
+                          <a:blip r:embed="rId4"/>
+                          <a:stretch>
+                            <a:fillRect l="-20628" t="-908333" r="-897" b="-226667"/>
+                          </a:stretch>
+                        </a:blipFill>
+                      </a:tcPr>
+                    </a:tc>
+                    <a:extLst>
+                      <a:ext uri="{0D108BD9-81ED-4DB2-BD59-A6C34878D82A}">
+                        <a16:rowId xmlns:a16="http://schemas.microsoft.com/office/drawing/2014/main" val="1383135423"/>
+                      </a:ext>
+                    </a:extLst>
+                  </a:tr>
+                  <a:tr h="365760">
+                    <a:tc>
+                      <a:txBody>
+                        <a:bodyPr/>
+                        <a:lstStyle/>
+                        <a:p>
+                          <a:r>
+                            <a:rPr lang="it-IT" dirty="0"/>
+                            <a:t>31</a:t>
+                          </a:r>
+                          <a:endParaRPr lang="en-US" dirty="0"/>
+                        </a:p>
+                      </a:txBody>
+                      <a:tcPr/>
+                    </a:tc>
+                    <a:tc>
+                      <a:txBody>
+                        <a:bodyPr/>
+                        <a:lstStyle/>
+                        <a:p>
+                          <a:endParaRPr lang="en-US"/>
+                        </a:p>
+                      </a:txBody>
+                      <a:tcPr>
+                        <a:blipFill>
+                          <a:blip r:embed="rId4"/>
+                          <a:stretch>
+                            <a:fillRect l="-20628" t="-1008333" r="-897" b="-126667"/>
+                          </a:stretch>
+                        </a:blipFill>
+                      </a:tcPr>
+                    </a:tc>
+                    <a:extLst>
+                      <a:ext uri="{0D108BD9-81ED-4DB2-BD59-A6C34878D82A}">
+                        <a16:rowId xmlns:a16="http://schemas.microsoft.com/office/drawing/2014/main" val="3776137944"/>
+                      </a:ext>
+                    </a:extLst>
+                  </a:tr>
+                  <a:tr h="365760">
+                    <a:tc>
+                      <a:txBody>
+                        <a:bodyPr/>
+                        <a:lstStyle/>
+                        <a:p>
+                          <a:r>
+                            <a:rPr lang="it-IT" dirty="0"/>
+                            <a:t>32</a:t>
+                          </a:r>
+                          <a:endParaRPr lang="en-US" dirty="0"/>
+                        </a:p>
+                      </a:txBody>
+                      <a:tcPr/>
+                    </a:tc>
+                    <a:tc>
+                      <a:txBody>
+                        <a:bodyPr/>
+                        <a:lstStyle/>
+                        <a:p>
+                          <a:endParaRPr lang="en-US"/>
+                        </a:p>
+                      </a:txBody>
+                      <a:tcPr>
+                        <a:blipFill>
+                          <a:blip r:embed="rId4"/>
+                          <a:stretch>
+                            <a:fillRect l="-20628" t="-1108333" r="-897" b="-26667"/>
+                          </a:stretch>
+                        </a:blipFill>
+                      </a:tcPr>
+                    </a:tc>
+                    <a:extLst>
+                      <a:ext uri="{0D108BD9-81ED-4DB2-BD59-A6C34878D82A}">
+                        <a16:rowId xmlns:a16="http://schemas.microsoft.com/office/drawing/2014/main" val="602303420"/>
+                      </a:ext>
+                    </a:extLst>
+                  </a:tr>
+                </a:tbl>
+              </a:graphicData>
+            </a:graphic>
+          </p:graphicFrame>
+        </mc:Fallback>
+      </mc:AlternateContent>
     </p:spTree>
     <p:extLst>
       <p:ext uri="{BB962C8B-B14F-4D97-AF65-F5344CB8AC3E}">
@@ -25911,10 +28102,10 @@
       </p:cxnSp>
       <p:sp>
         <p:nvSpPr>
-          <p:cNvPr id="18" name="Rectangle 17">
+          <p:cNvPr id="3" name="Rectangle 2">
             <a:extLst>
               <a:ext uri="{FF2B5EF4-FFF2-40B4-BE49-F238E27FC236}">
-                <a16:creationId xmlns:a16="http://schemas.microsoft.com/office/drawing/2014/main" id="{994CB213-E2D4-2E3C-9910-F66F6A2A4F6B}"/>
+                <a16:creationId xmlns:a16="http://schemas.microsoft.com/office/drawing/2014/main" id="{85B11646-7FCC-55A7-C8EA-09C9A6793322}"/>
               </a:ext>
             </a:extLst>
           </p:cNvPr>
@@ -25923,8 +28114,8 @@
         </p:nvSpPr>
         <p:spPr>
           <a:xfrm>
-            <a:off x="3066314" y="1849921"/>
-            <a:ext cx="1027789" cy="291881"/>
+            <a:off x="3093637" y="1987869"/>
+            <a:ext cx="1027789" cy="171450"/>
           </a:xfrm>
           <a:prstGeom prst="rect">
             <a:avLst/>
@@ -25965,7 +28156,7 @@
                   <a:srgbClr val="FF0000"/>
                 </a:solidFill>
               </a:rPr>
-              <a:t>PREVIOUSLY_ACTIVE</a:t>
+              <a:t>OUT_V_SET</a:t>
             </a:r>
             <a:endParaRPr lang="en-US" sz="800" dirty="0">
               <a:solidFill>
@@ -25977,10 +28168,10 @@
       </p:sp>
       <p:sp>
         <p:nvSpPr>
-          <p:cNvPr id="19" name="Rectangle 18">
+          <p:cNvPr id="9" name="Rectangle 8">
             <a:extLst>
               <a:ext uri="{FF2B5EF4-FFF2-40B4-BE49-F238E27FC236}">
-                <a16:creationId xmlns:a16="http://schemas.microsoft.com/office/drawing/2014/main" id="{D07C3A0F-A66E-CCB7-C5D4-7AF3738FCDCC}"/>
+                <a16:creationId xmlns:a16="http://schemas.microsoft.com/office/drawing/2014/main" id="{735ABCDB-7BBB-62D8-C8C2-B51B426EC59B}"/>
               </a:ext>
             </a:extLst>
           </p:cNvPr>
@@ -25989,8 +28180,8 @@
         </p:nvSpPr>
         <p:spPr>
           <a:xfrm>
-            <a:off x="4348792" y="1879244"/>
-            <a:ext cx="1027789" cy="291881"/>
+            <a:off x="6284097" y="1995659"/>
+            <a:ext cx="1027789" cy="171450"/>
           </a:xfrm>
           <a:prstGeom prst="rect">
             <a:avLst/>
@@ -26031,7 +28222,7 @@
                   <a:srgbClr val="FF0000"/>
                 </a:solidFill>
               </a:rPr>
-              <a:t>CURRENTLY ACTIVE</a:t>
+              <a:t>OUT_V_SET</a:t>
             </a:r>
             <a:endParaRPr lang="en-US" sz="800" dirty="0">
               <a:solidFill>
@@ -26043,10 +28234,10 @@
       </p:sp>
       <p:sp>
         <p:nvSpPr>
-          <p:cNvPr id="20" name="Rectangle 19">
+          <p:cNvPr id="11" name="Rectangle 10">
             <a:extLst>
               <a:ext uri="{FF2B5EF4-FFF2-40B4-BE49-F238E27FC236}">
-                <a16:creationId xmlns:a16="http://schemas.microsoft.com/office/drawing/2014/main" id="{8BDA5ABC-CE6F-E09F-7C58-FF3E1B8C463C}"/>
+                <a16:creationId xmlns:a16="http://schemas.microsoft.com/office/drawing/2014/main" id="{978110DB-152F-16B2-E808-C7644DCB00BF}"/>
               </a:ext>
             </a:extLst>
           </p:cNvPr>
@@ -26055,8 +28246,8 @@
         </p:nvSpPr>
         <p:spPr>
           <a:xfrm>
-            <a:off x="1135139" y="1849921"/>
-            <a:ext cx="1027789" cy="291881"/>
+            <a:off x="9367956" y="1987869"/>
+            <a:ext cx="1027789" cy="171450"/>
           </a:xfrm>
           <a:prstGeom prst="rect">
             <a:avLst/>
@@ -26097,7 +28288,7 @@
                   <a:srgbClr val="FF0000"/>
                 </a:solidFill>
               </a:rPr>
-              <a:t>CURRENTLY ACTIVE</a:t>
+              <a:t>OUT_V_SET</a:t>
             </a:r>
             <a:endParaRPr lang="en-US" sz="800" dirty="0">
               <a:solidFill>
@@ -26107,404 +28298,6 @@
           </a:p>
         </p:txBody>
       </p:sp>
-      <p:sp>
-        <p:nvSpPr>
-          <p:cNvPr id="21" name="Rectangle 20">
-            <a:extLst>
-              <a:ext uri="{FF2B5EF4-FFF2-40B4-BE49-F238E27FC236}">
-                <a16:creationId xmlns:a16="http://schemas.microsoft.com/office/drawing/2014/main" id="{ADA68ABA-AAC7-562C-0255-C29C7A82D530}"/>
-              </a:ext>
-            </a:extLst>
-          </p:cNvPr>
-          <p:cNvSpPr/>
-          <p:nvPr/>
-        </p:nvSpPr>
-        <p:spPr>
-          <a:xfrm>
-            <a:off x="6272363" y="1890098"/>
-            <a:ext cx="1027789" cy="291881"/>
-          </a:xfrm>
-          <a:prstGeom prst="rect">
-            <a:avLst/>
-          </a:prstGeom>
-          <a:solidFill>
-            <a:srgbClr val="FFFF00"/>
-          </a:solidFill>
-          <a:ln>
-            <a:solidFill>
-              <a:schemeClr val="bg1"/>
-            </a:solidFill>
-          </a:ln>
-        </p:spPr>
-        <p:style>
-          <a:lnRef idx="2">
-            <a:schemeClr val="accent1">
-              <a:shade val="50000"/>
-            </a:schemeClr>
-          </a:lnRef>
-          <a:fillRef idx="1">
-            <a:schemeClr val="accent1"/>
-          </a:fillRef>
-          <a:effectRef idx="0">
-            <a:schemeClr val="accent1"/>
-          </a:effectRef>
-          <a:fontRef idx="minor">
-            <a:schemeClr val="lt1"/>
-          </a:fontRef>
-        </p:style>
-        <p:txBody>
-          <a:bodyPr rtlCol="0" anchor="ctr"/>
-          <a:lstStyle/>
-          <a:p>
-            <a:pPr algn="ctr"/>
-            <a:r>
-              <a:rPr lang="it-IT" sz="800" dirty="0">
-                <a:solidFill>
-                  <a:srgbClr val="FF0000"/>
-                </a:solidFill>
-              </a:rPr>
-              <a:t>PREVIOUSLY_ACTIVE</a:t>
-            </a:r>
-            <a:endParaRPr lang="en-US" sz="800" dirty="0">
-              <a:solidFill>
-                <a:srgbClr val="FF0000"/>
-              </a:solidFill>
-            </a:endParaRPr>
-          </a:p>
-        </p:txBody>
-      </p:sp>
-      <p:sp>
-        <p:nvSpPr>
-          <p:cNvPr id="22" name="Rectangle 21">
-            <a:extLst>
-              <a:ext uri="{FF2B5EF4-FFF2-40B4-BE49-F238E27FC236}">
-                <a16:creationId xmlns:a16="http://schemas.microsoft.com/office/drawing/2014/main" id="{67400519-DD0E-8359-B8B8-4659BC6CDAD8}"/>
-              </a:ext>
-            </a:extLst>
-          </p:cNvPr>
-          <p:cNvSpPr/>
-          <p:nvPr/>
-        </p:nvSpPr>
-        <p:spPr>
-          <a:xfrm>
-            <a:off x="9150464" y="1864888"/>
-            <a:ext cx="1027789" cy="291881"/>
-          </a:xfrm>
-          <a:prstGeom prst="rect">
-            <a:avLst/>
-          </a:prstGeom>
-          <a:solidFill>
-            <a:srgbClr val="FFFF00"/>
-          </a:solidFill>
-          <a:ln>
-            <a:solidFill>
-              <a:schemeClr val="bg1"/>
-            </a:solidFill>
-          </a:ln>
-        </p:spPr>
-        <p:style>
-          <a:lnRef idx="2">
-            <a:schemeClr val="accent1">
-              <a:shade val="50000"/>
-            </a:schemeClr>
-          </a:lnRef>
-          <a:fillRef idx="1">
-            <a:schemeClr val="accent1"/>
-          </a:fillRef>
-          <a:effectRef idx="0">
-            <a:schemeClr val="accent1"/>
-          </a:effectRef>
-          <a:fontRef idx="minor">
-            <a:schemeClr val="lt1"/>
-          </a:fontRef>
-        </p:style>
-        <p:txBody>
-          <a:bodyPr rtlCol="0" anchor="ctr"/>
-          <a:lstStyle/>
-          <a:p>
-            <a:pPr algn="ctr"/>
-            <a:r>
-              <a:rPr lang="it-IT" sz="800" dirty="0">
-                <a:solidFill>
-                  <a:srgbClr val="FF0000"/>
-                </a:solidFill>
-              </a:rPr>
-              <a:t>PREVIOUSLY_ACTIVE</a:t>
-            </a:r>
-            <a:endParaRPr lang="en-US" sz="800" dirty="0">
-              <a:solidFill>
-                <a:srgbClr val="FF0000"/>
-              </a:solidFill>
-            </a:endParaRPr>
-          </a:p>
-        </p:txBody>
-      </p:sp>
-      <p:sp>
-        <p:nvSpPr>
-          <p:cNvPr id="23" name="Rectangle 22">
-            <a:extLst>
-              <a:ext uri="{FF2B5EF4-FFF2-40B4-BE49-F238E27FC236}">
-                <a16:creationId xmlns:a16="http://schemas.microsoft.com/office/drawing/2014/main" id="{C6F4DC67-80EF-72EA-9288-2632EEF92228}"/>
-              </a:ext>
-            </a:extLst>
-          </p:cNvPr>
-          <p:cNvSpPr/>
-          <p:nvPr/>
-        </p:nvSpPr>
-        <p:spPr>
-          <a:xfrm>
-            <a:off x="7481499" y="1890098"/>
-            <a:ext cx="1027789" cy="291881"/>
-          </a:xfrm>
-          <a:prstGeom prst="rect">
-            <a:avLst/>
-          </a:prstGeom>
-          <a:solidFill>
-            <a:srgbClr val="FFFF00"/>
-          </a:solidFill>
-          <a:ln>
-            <a:solidFill>
-              <a:schemeClr val="bg1"/>
-            </a:solidFill>
-          </a:ln>
-        </p:spPr>
-        <p:style>
-          <a:lnRef idx="2">
-            <a:schemeClr val="accent1">
-              <a:shade val="50000"/>
-            </a:schemeClr>
-          </a:lnRef>
-          <a:fillRef idx="1">
-            <a:schemeClr val="accent1"/>
-          </a:fillRef>
-          <a:effectRef idx="0">
-            <a:schemeClr val="accent1"/>
-          </a:effectRef>
-          <a:fontRef idx="minor">
-            <a:schemeClr val="lt1"/>
-          </a:fontRef>
-        </p:style>
-        <p:txBody>
-          <a:bodyPr rtlCol="0" anchor="ctr"/>
-          <a:lstStyle/>
-          <a:p>
-            <a:pPr algn="ctr"/>
-            <a:r>
-              <a:rPr lang="it-IT" sz="800" dirty="0">
-                <a:solidFill>
-                  <a:srgbClr val="FF0000"/>
-                </a:solidFill>
-              </a:rPr>
-              <a:t>CURRENTLY ACTIVE</a:t>
-            </a:r>
-            <a:endParaRPr lang="en-US" sz="800" dirty="0">
-              <a:solidFill>
-                <a:srgbClr val="FF0000"/>
-              </a:solidFill>
-            </a:endParaRPr>
-          </a:p>
-        </p:txBody>
-      </p:sp>
-      <p:cxnSp>
-        <p:nvCxnSpPr>
-          <p:cNvPr id="33" name="Straight Arrow Connector 32">
-            <a:extLst>
-              <a:ext uri="{FF2B5EF4-FFF2-40B4-BE49-F238E27FC236}">
-                <a16:creationId xmlns:a16="http://schemas.microsoft.com/office/drawing/2014/main" id="{33B6B607-8789-D83A-549E-99C35BFC3757}"/>
-              </a:ext>
-            </a:extLst>
-          </p:cNvPr>
-          <p:cNvCxnSpPr>
-            <a:cxnSpLocks/>
-            <a:endCxn id="18" idx="3"/>
-          </p:cNvCxnSpPr>
-          <p:nvPr/>
-        </p:nvCxnSpPr>
-        <p:spPr>
-          <a:xfrm flipH="1" flipV="1">
-            <a:off x="4094103" y="1995862"/>
-            <a:ext cx="257135" cy="29322"/>
-          </a:xfrm>
-          <a:prstGeom prst="straightConnector1">
-            <a:avLst/>
-          </a:prstGeom>
-          <a:ln w="28575">
-            <a:solidFill>
-              <a:srgbClr val="FF0000"/>
-            </a:solidFill>
-            <a:tailEnd type="triangle"/>
-          </a:ln>
-        </p:spPr>
-        <p:style>
-          <a:lnRef idx="1">
-            <a:schemeClr val="dk1"/>
-          </a:lnRef>
-          <a:fillRef idx="0">
-            <a:schemeClr val="dk1"/>
-          </a:fillRef>
-          <a:effectRef idx="0">
-            <a:schemeClr val="dk1"/>
-          </a:effectRef>
-          <a:fontRef idx="minor">
-            <a:schemeClr val="tx1"/>
-          </a:fontRef>
-        </p:style>
-      </p:cxnSp>
-      <p:cxnSp>
-        <p:nvCxnSpPr>
-          <p:cNvPr id="41" name="Straight Arrow Connector 40">
-            <a:extLst>
-              <a:ext uri="{FF2B5EF4-FFF2-40B4-BE49-F238E27FC236}">
-                <a16:creationId xmlns:a16="http://schemas.microsoft.com/office/drawing/2014/main" id="{6C055353-9A66-58A8-AE2F-5C516CBEF792}"/>
-              </a:ext>
-            </a:extLst>
-          </p:cNvPr>
-          <p:cNvCxnSpPr>
-            <a:cxnSpLocks/>
-          </p:cNvCxnSpPr>
-          <p:nvPr/>
-        </p:nvCxnSpPr>
-        <p:spPr>
-          <a:xfrm flipH="1" flipV="1">
-            <a:off x="7225395" y="2036038"/>
-            <a:ext cx="301357" cy="1"/>
-          </a:xfrm>
-          <a:prstGeom prst="straightConnector1">
-            <a:avLst/>
-          </a:prstGeom>
-          <a:ln w="28575">
-            <a:solidFill>
-              <a:srgbClr val="FF0000"/>
-            </a:solidFill>
-            <a:tailEnd type="triangle"/>
-          </a:ln>
-        </p:spPr>
-        <p:style>
-          <a:lnRef idx="1">
-            <a:schemeClr val="dk1"/>
-          </a:lnRef>
-          <a:fillRef idx="0">
-            <a:schemeClr val="dk1"/>
-          </a:fillRef>
-          <a:effectRef idx="0">
-            <a:schemeClr val="dk1"/>
-          </a:effectRef>
-          <a:fontRef idx="minor">
-            <a:schemeClr val="tx1"/>
-          </a:fontRef>
-        </p:style>
-      </p:cxnSp>
-      <p:sp>
-        <p:nvSpPr>
-          <p:cNvPr id="45" name="Rectangle 44">
-            <a:extLst>
-              <a:ext uri="{FF2B5EF4-FFF2-40B4-BE49-F238E27FC236}">
-                <a16:creationId xmlns:a16="http://schemas.microsoft.com/office/drawing/2014/main" id="{3DF3CC11-3B63-2F33-6FF9-0A18ED5184B8}"/>
-              </a:ext>
-            </a:extLst>
-          </p:cNvPr>
-          <p:cNvSpPr/>
-          <p:nvPr/>
-        </p:nvSpPr>
-        <p:spPr>
-          <a:xfrm>
-            <a:off x="10758986" y="1555640"/>
-            <a:ext cx="1027789" cy="291881"/>
-          </a:xfrm>
-          <a:prstGeom prst="rect">
-            <a:avLst/>
-          </a:prstGeom>
-          <a:solidFill>
-            <a:srgbClr val="FFFF00"/>
-          </a:solidFill>
-          <a:ln>
-            <a:solidFill>
-              <a:schemeClr val="bg1"/>
-            </a:solidFill>
-          </a:ln>
-        </p:spPr>
-        <p:style>
-          <a:lnRef idx="2">
-            <a:schemeClr val="accent1">
-              <a:shade val="50000"/>
-            </a:schemeClr>
-          </a:lnRef>
-          <a:fillRef idx="1">
-            <a:schemeClr val="accent1"/>
-          </a:fillRef>
-          <a:effectRef idx="0">
-            <a:schemeClr val="accent1"/>
-          </a:effectRef>
-          <a:fontRef idx="minor">
-            <a:schemeClr val="lt1"/>
-          </a:fontRef>
-        </p:style>
-        <p:txBody>
-          <a:bodyPr rtlCol="0" anchor="ctr"/>
-          <a:lstStyle/>
-          <a:p>
-            <a:pPr algn="ctr"/>
-            <a:r>
-              <a:rPr lang="it-IT" sz="800" dirty="0">
-                <a:solidFill>
-                  <a:srgbClr val="FF0000"/>
-                </a:solidFill>
-              </a:rPr>
-              <a:t>PREVIIOUSLY_ACTIVE</a:t>
-            </a:r>
-            <a:endParaRPr lang="en-US" sz="800" dirty="0">
-              <a:solidFill>
-                <a:srgbClr val="FF0000"/>
-              </a:solidFill>
-            </a:endParaRPr>
-          </a:p>
-        </p:txBody>
-      </p:sp>
-      <p:cxnSp>
-        <p:nvCxnSpPr>
-          <p:cNvPr id="47" name="Straight Arrow Connector 46">
-            <a:extLst>
-              <a:ext uri="{FF2B5EF4-FFF2-40B4-BE49-F238E27FC236}">
-                <a16:creationId xmlns:a16="http://schemas.microsoft.com/office/drawing/2014/main" id="{6950FCC3-B3B0-F0FF-5CA7-4A2D68C4E41D}"/>
-              </a:ext>
-            </a:extLst>
-          </p:cNvPr>
-          <p:cNvCxnSpPr>
-            <a:cxnSpLocks/>
-            <a:endCxn id="22" idx="3"/>
-          </p:cNvCxnSpPr>
-          <p:nvPr/>
-        </p:nvCxnSpPr>
-        <p:spPr>
-          <a:xfrm flipH="1">
-            <a:off x="10178253" y="1701581"/>
-            <a:ext cx="598071" cy="309248"/>
-          </a:xfrm>
-          <a:prstGeom prst="straightConnector1">
-            <a:avLst/>
-          </a:prstGeom>
-          <a:ln w="28575">
-            <a:solidFill>
-              <a:srgbClr val="FF0000"/>
-            </a:solidFill>
-            <a:tailEnd type="triangle"/>
-          </a:ln>
-        </p:spPr>
-        <p:style>
-          <a:lnRef idx="1">
-            <a:schemeClr val="dk1"/>
-          </a:lnRef>
-          <a:fillRef idx="0">
-            <a:schemeClr val="dk1"/>
-          </a:fillRef>
-          <a:effectRef idx="0">
-            <a:schemeClr val="dk1"/>
-          </a:effectRef>
-          <a:fontRef idx="minor">
-            <a:schemeClr val="tx1"/>
-          </a:fontRef>
-        </p:style>
-      </p:cxnSp>
     </p:spTree>
     <p:extLst>
       <p:ext uri="{BB962C8B-B14F-4D97-AF65-F5344CB8AC3E}">

</xml_diff>